<commit_message>
Added graphic for outperformance on ABV/IBU
</commit_message>
<xml_diff>
--- a/Case Study - Project 1 - Final.pptx
+++ b/Case Study - Project 1 - Final.pptx
@@ -4,13 +4,16 @@
   <p:sldMasterIdLst>
     <p:sldMasterId id="2147483648" r:id="rId1"/>
   </p:sldMasterIdLst>
+  <p:notesMasterIdLst>
+    <p:notesMasterId r:id="rId12"/>
+  </p:notesMasterIdLst>
   <p:sldIdLst>
     <p:sldId id="256" r:id="rId2"/>
     <p:sldId id="266" r:id="rId3"/>
     <p:sldId id="257" r:id="rId4"/>
-    <p:sldId id="259" r:id="rId5"/>
-    <p:sldId id="258" r:id="rId6"/>
-    <p:sldId id="261" r:id="rId7"/>
+    <p:sldId id="279" r:id="rId5"/>
+    <p:sldId id="259" r:id="rId6"/>
+    <p:sldId id="258" r:id="rId7"/>
     <p:sldId id="262" r:id="rId8"/>
     <p:sldId id="263" r:id="rId9"/>
     <p:sldId id="278" r:id="rId10"/>
@@ -119,6 +122,523 @@
     </p:ext>
   </p:extLst>
 </p:presentation>
+</file>
+
+<file path=ppt/notesMasters/notesMaster1.xml><?xml version="1.0" encoding="utf-8"?>
+<p:notesMaster xmlns:a="http://schemas.openxmlformats.org/drawingml/2006/main" xmlns:r="http://schemas.openxmlformats.org/officeDocument/2006/relationships" xmlns:p="http://schemas.openxmlformats.org/presentationml/2006/main">
+  <p:cSld>
+    <p:bg>
+      <p:bgRef idx="1001">
+        <a:schemeClr val="bg1"/>
+      </p:bgRef>
+    </p:bg>
+    <p:spTree>
+      <p:nvGrpSpPr>
+        <p:cNvPr id="1" name=""/>
+        <p:cNvGrpSpPr/>
+        <p:nvPr/>
+      </p:nvGrpSpPr>
+      <p:grpSpPr>
+        <a:xfrm>
+          <a:off x="0" y="0"/>
+          <a:ext cx="0" cy="0"/>
+          <a:chOff x="0" y="0"/>
+          <a:chExt cx="0" cy="0"/>
+        </a:xfrm>
+      </p:grpSpPr>
+      <p:sp>
+        <p:nvSpPr>
+          <p:cNvPr id="2" name="Header Placeholder 1"/>
+          <p:cNvSpPr>
+            <a:spLocks noGrp="1"/>
+          </p:cNvSpPr>
+          <p:nvPr>
+            <p:ph type="hdr" sz="quarter"/>
+          </p:nvPr>
+        </p:nvSpPr>
+        <p:spPr>
+          <a:xfrm>
+            <a:off x="0" y="0"/>
+            <a:ext cx="2971800" cy="458788"/>
+          </a:xfrm>
+          <a:prstGeom prst="rect">
+            <a:avLst/>
+          </a:prstGeom>
+        </p:spPr>
+        <p:txBody>
+          <a:bodyPr vert="horz" lIns="91440" tIns="45720" rIns="91440" bIns="45720" rtlCol="0"/>
+          <a:lstStyle>
+            <a:lvl1pPr algn="l">
+              <a:defRPr sz="1200"/>
+            </a:lvl1pPr>
+          </a:lstStyle>
+          <a:p>
+            <a:endParaRPr lang="en-US"/>
+          </a:p>
+        </p:txBody>
+      </p:sp>
+      <p:sp>
+        <p:nvSpPr>
+          <p:cNvPr id="3" name="Date Placeholder 2"/>
+          <p:cNvSpPr>
+            <a:spLocks noGrp="1"/>
+          </p:cNvSpPr>
+          <p:nvPr>
+            <p:ph type="dt" idx="1"/>
+          </p:nvPr>
+        </p:nvSpPr>
+        <p:spPr>
+          <a:xfrm>
+            <a:off x="3884613" y="0"/>
+            <a:ext cx="2971800" cy="458788"/>
+          </a:xfrm>
+          <a:prstGeom prst="rect">
+            <a:avLst/>
+          </a:prstGeom>
+        </p:spPr>
+        <p:txBody>
+          <a:bodyPr vert="horz" lIns="91440" tIns="45720" rIns="91440" bIns="45720" rtlCol="0"/>
+          <a:lstStyle>
+            <a:lvl1pPr algn="r">
+              <a:defRPr sz="1200"/>
+            </a:lvl1pPr>
+          </a:lstStyle>
+          <a:p>
+            <a:fld id="{4586B1FD-F6BF-C140-9DD4-6741C72BEFCA}" type="datetimeFigureOut">
+              <a:rPr lang="en-US" smtClean="0"/>
+              <a:t>6/25/18</a:t>
+            </a:fld>
+            <a:endParaRPr lang="en-US"/>
+          </a:p>
+        </p:txBody>
+      </p:sp>
+      <p:sp>
+        <p:nvSpPr>
+          <p:cNvPr id="4" name="Slide Image Placeholder 3"/>
+          <p:cNvSpPr>
+            <a:spLocks noGrp="1" noRot="1" noChangeAspect="1"/>
+          </p:cNvSpPr>
+          <p:nvPr>
+            <p:ph type="sldImg" idx="2"/>
+          </p:nvPr>
+        </p:nvSpPr>
+        <p:spPr>
+          <a:xfrm>
+            <a:off x="685800" y="1143000"/>
+            <a:ext cx="5486400" cy="3086100"/>
+          </a:xfrm>
+          <a:prstGeom prst="rect">
+            <a:avLst/>
+          </a:prstGeom>
+          <a:noFill/>
+          <a:ln w="12700">
+            <a:solidFill>
+              <a:prstClr val="black"/>
+            </a:solidFill>
+          </a:ln>
+        </p:spPr>
+        <p:txBody>
+          <a:bodyPr vert="horz" lIns="91440" tIns="45720" rIns="91440" bIns="45720" rtlCol="0" anchor="ctr"/>
+          <a:lstStyle/>
+          <a:p>
+            <a:endParaRPr lang="en-US"/>
+          </a:p>
+        </p:txBody>
+      </p:sp>
+      <p:sp>
+        <p:nvSpPr>
+          <p:cNvPr id="5" name="Notes Placeholder 4"/>
+          <p:cNvSpPr>
+            <a:spLocks noGrp="1"/>
+          </p:cNvSpPr>
+          <p:nvPr>
+            <p:ph type="body" sz="quarter" idx="3"/>
+          </p:nvPr>
+        </p:nvSpPr>
+        <p:spPr>
+          <a:xfrm>
+            <a:off x="685800" y="4400550"/>
+            <a:ext cx="5486400" cy="3600450"/>
+          </a:xfrm>
+          <a:prstGeom prst="rect">
+            <a:avLst/>
+          </a:prstGeom>
+        </p:spPr>
+        <p:txBody>
+          <a:bodyPr vert="horz" lIns="91440" tIns="45720" rIns="91440" bIns="45720" rtlCol="0"/>
+          <a:lstStyle/>
+          <a:p>
+            <a:pPr lvl="0"/>
+            <a:r>
+              <a:rPr lang="en-US"/>
+              <a:t>Edit Master text styles</a:t>
+            </a:r>
+          </a:p>
+          <a:p>
+            <a:pPr lvl="1"/>
+            <a:r>
+              <a:rPr lang="en-US"/>
+              <a:t>Second level</a:t>
+            </a:r>
+          </a:p>
+          <a:p>
+            <a:pPr lvl="2"/>
+            <a:r>
+              <a:rPr lang="en-US"/>
+              <a:t>Third level</a:t>
+            </a:r>
+          </a:p>
+          <a:p>
+            <a:pPr lvl="3"/>
+            <a:r>
+              <a:rPr lang="en-US"/>
+              <a:t>Fourth level</a:t>
+            </a:r>
+          </a:p>
+          <a:p>
+            <a:pPr lvl="4"/>
+            <a:r>
+              <a:rPr lang="en-US"/>
+              <a:t>Fifth level</a:t>
+            </a:r>
+          </a:p>
+        </p:txBody>
+      </p:sp>
+      <p:sp>
+        <p:nvSpPr>
+          <p:cNvPr id="6" name="Footer Placeholder 5"/>
+          <p:cNvSpPr>
+            <a:spLocks noGrp="1"/>
+          </p:cNvSpPr>
+          <p:nvPr>
+            <p:ph type="ftr" sz="quarter" idx="4"/>
+          </p:nvPr>
+        </p:nvSpPr>
+        <p:spPr>
+          <a:xfrm>
+            <a:off x="0" y="8685213"/>
+            <a:ext cx="2971800" cy="458787"/>
+          </a:xfrm>
+          <a:prstGeom prst="rect">
+            <a:avLst/>
+          </a:prstGeom>
+        </p:spPr>
+        <p:txBody>
+          <a:bodyPr vert="horz" lIns="91440" tIns="45720" rIns="91440" bIns="45720" rtlCol="0" anchor="b"/>
+          <a:lstStyle>
+            <a:lvl1pPr algn="l">
+              <a:defRPr sz="1200"/>
+            </a:lvl1pPr>
+          </a:lstStyle>
+          <a:p>
+            <a:endParaRPr lang="en-US"/>
+          </a:p>
+        </p:txBody>
+      </p:sp>
+      <p:sp>
+        <p:nvSpPr>
+          <p:cNvPr id="7" name="Slide Number Placeholder 6"/>
+          <p:cNvSpPr>
+            <a:spLocks noGrp="1"/>
+          </p:cNvSpPr>
+          <p:nvPr>
+            <p:ph type="sldNum" sz="quarter" idx="5"/>
+          </p:nvPr>
+        </p:nvSpPr>
+        <p:spPr>
+          <a:xfrm>
+            <a:off x="3884613" y="8685213"/>
+            <a:ext cx="2971800" cy="458787"/>
+          </a:xfrm>
+          <a:prstGeom prst="rect">
+            <a:avLst/>
+          </a:prstGeom>
+        </p:spPr>
+        <p:txBody>
+          <a:bodyPr vert="horz" lIns="91440" tIns="45720" rIns="91440" bIns="45720" rtlCol="0" anchor="b"/>
+          <a:lstStyle>
+            <a:lvl1pPr algn="r">
+              <a:defRPr sz="1200"/>
+            </a:lvl1pPr>
+          </a:lstStyle>
+          <a:p>
+            <a:fld id="{13A72274-11AC-8C41-AE0A-D20F8A90A56D}" type="slidenum">
+              <a:rPr lang="en-US" smtClean="0"/>
+              <a:t>‹#›</a:t>
+            </a:fld>
+            <a:endParaRPr lang="en-US"/>
+          </a:p>
+        </p:txBody>
+      </p:sp>
+    </p:spTree>
+    <p:extLst>
+      <p:ext uri="{BB962C8B-B14F-4D97-AF65-F5344CB8AC3E}">
+        <p14:creationId xmlns:p14="http://schemas.microsoft.com/office/powerpoint/2010/main" val="2154822351"/>
+      </p:ext>
+    </p:extLst>
+  </p:cSld>
+  <p:clrMap bg1="lt1" tx1="dk1" bg2="lt2" tx2="dk2" accent1="accent1" accent2="accent2" accent3="accent3" accent4="accent4" accent5="accent5" accent6="accent6" hlink="hlink" folHlink="folHlink"/>
+  <p:notesStyle>
+    <a:lvl1pPr marL="0" algn="l" defTabSz="914400" rtl="0" eaLnBrk="1" latinLnBrk="0" hangingPunct="1">
+      <a:defRPr sz="1200" kern="1200">
+        <a:solidFill>
+          <a:schemeClr val="tx1"/>
+        </a:solidFill>
+        <a:latin typeface="+mn-lt"/>
+        <a:ea typeface="+mn-ea"/>
+        <a:cs typeface="+mn-cs"/>
+      </a:defRPr>
+    </a:lvl1pPr>
+    <a:lvl2pPr marL="457200" algn="l" defTabSz="914400" rtl="0" eaLnBrk="1" latinLnBrk="0" hangingPunct="1">
+      <a:defRPr sz="1200" kern="1200">
+        <a:solidFill>
+          <a:schemeClr val="tx1"/>
+        </a:solidFill>
+        <a:latin typeface="+mn-lt"/>
+        <a:ea typeface="+mn-ea"/>
+        <a:cs typeface="+mn-cs"/>
+      </a:defRPr>
+    </a:lvl2pPr>
+    <a:lvl3pPr marL="914400" algn="l" defTabSz="914400" rtl="0" eaLnBrk="1" latinLnBrk="0" hangingPunct="1">
+      <a:defRPr sz="1200" kern="1200">
+        <a:solidFill>
+          <a:schemeClr val="tx1"/>
+        </a:solidFill>
+        <a:latin typeface="+mn-lt"/>
+        <a:ea typeface="+mn-ea"/>
+        <a:cs typeface="+mn-cs"/>
+      </a:defRPr>
+    </a:lvl3pPr>
+    <a:lvl4pPr marL="1371600" algn="l" defTabSz="914400" rtl="0" eaLnBrk="1" latinLnBrk="0" hangingPunct="1">
+      <a:defRPr sz="1200" kern="1200">
+        <a:solidFill>
+          <a:schemeClr val="tx1"/>
+        </a:solidFill>
+        <a:latin typeface="+mn-lt"/>
+        <a:ea typeface="+mn-ea"/>
+        <a:cs typeface="+mn-cs"/>
+      </a:defRPr>
+    </a:lvl4pPr>
+    <a:lvl5pPr marL="1828800" algn="l" defTabSz="914400" rtl="0" eaLnBrk="1" latinLnBrk="0" hangingPunct="1">
+      <a:defRPr sz="1200" kern="1200">
+        <a:solidFill>
+          <a:schemeClr val="tx1"/>
+        </a:solidFill>
+        <a:latin typeface="+mn-lt"/>
+        <a:ea typeface="+mn-ea"/>
+        <a:cs typeface="+mn-cs"/>
+      </a:defRPr>
+    </a:lvl5pPr>
+    <a:lvl6pPr marL="2286000" algn="l" defTabSz="914400" rtl="0" eaLnBrk="1" latinLnBrk="0" hangingPunct="1">
+      <a:defRPr sz="1200" kern="1200">
+        <a:solidFill>
+          <a:schemeClr val="tx1"/>
+        </a:solidFill>
+        <a:latin typeface="+mn-lt"/>
+        <a:ea typeface="+mn-ea"/>
+        <a:cs typeface="+mn-cs"/>
+      </a:defRPr>
+    </a:lvl6pPr>
+    <a:lvl7pPr marL="2743200" algn="l" defTabSz="914400" rtl="0" eaLnBrk="1" latinLnBrk="0" hangingPunct="1">
+      <a:defRPr sz="1200" kern="1200">
+        <a:solidFill>
+          <a:schemeClr val="tx1"/>
+        </a:solidFill>
+        <a:latin typeface="+mn-lt"/>
+        <a:ea typeface="+mn-ea"/>
+        <a:cs typeface="+mn-cs"/>
+      </a:defRPr>
+    </a:lvl7pPr>
+    <a:lvl8pPr marL="3200400" algn="l" defTabSz="914400" rtl="0" eaLnBrk="1" latinLnBrk="0" hangingPunct="1">
+      <a:defRPr sz="1200" kern="1200">
+        <a:solidFill>
+          <a:schemeClr val="tx1"/>
+        </a:solidFill>
+        <a:latin typeface="+mn-lt"/>
+        <a:ea typeface="+mn-ea"/>
+        <a:cs typeface="+mn-cs"/>
+      </a:defRPr>
+    </a:lvl8pPr>
+    <a:lvl9pPr marL="3657600" algn="l" defTabSz="914400" rtl="0" eaLnBrk="1" latinLnBrk="0" hangingPunct="1">
+      <a:defRPr sz="1200" kern="1200">
+        <a:solidFill>
+          <a:schemeClr val="tx1"/>
+        </a:solidFill>
+        <a:latin typeface="+mn-lt"/>
+        <a:ea typeface="+mn-ea"/>
+        <a:cs typeface="+mn-cs"/>
+      </a:defRPr>
+    </a:lvl9pPr>
+  </p:notesStyle>
+</p:notesMaster>
+</file>
+
+<file path=ppt/notesSlides/notesSlide1.xml><?xml version="1.0" encoding="utf-8"?>
+<p:notes xmlns:a="http://schemas.openxmlformats.org/drawingml/2006/main" xmlns:r="http://schemas.openxmlformats.org/officeDocument/2006/relationships" xmlns:p="http://schemas.openxmlformats.org/presentationml/2006/main">
+  <p:cSld>
+    <p:spTree>
+      <p:nvGrpSpPr>
+        <p:cNvPr id="1" name=""/>
+        <p:cNvGrpSpPr/>
+        <p:nvPr/>
+      </p:nvGrpSpPr>
+      <p:grpSpPr>
+        <a:xfrm>
+          <a:off x="0" y="0"/>
+          <a:ext cx="0" cy="0"/>
+          <a:chOff x="0" y="0"/>
+          <a:chExt cx="0" cy="0"/>
+        </a:xfrm>
+      </p:grpSpPr>
+      <p:sp>
+        <p:nvSpPr>
+          <p:cNvPr id="2" name="Slide Image Placeholder 1"/>
+          <p:cNvSpPr>
+            <a:spLocks noGrp="1" noRot="1" noChangeAspect="1"/>
+          </p:cNvSpPr>
+          <p:nvPr>
+            <p:ph type="sldImg"/>
+          </p:nvPr>
+        </p:nvSpPr>
+        <p:spPr/>
+      </p:sp>
+      <p:sp>
+        <p:nvSpPr>
+          <p:cNvPr id="3" name="Notes Placeholder 2"/>
+          <p:cNvSpPr>
+            <a:spLocks noGrp="1"/>
+          </p:cNvSpPr>
+          <p:nvPr>
+            <p:ph type="body" idx="1"/>
+          </p:nvPr>
+        </p:nvSpPr>
+        <p:spPr/>
+        <p:txBody>
+          <a:bodyPr/>
+          <a:lstStyle/>
+          <a:p>
+            <a:endParaRPr lang="en-US"/>
+          </a:p>
+        </p:txBody>
+      </p:sp>
+      <p:sp>
+        <p:nvSpPr>
+          <p:cNvPr id="4" name="Slide Number Placeholder 3"/>
+          <p:cNvSpPr>
+            <a:spLocks noGrp="1"/>
+          </p:cNvSpPr>
+          <p:nvPr>
+            <p:ph type="sldNum" sz="quarter" idx="10"/>
+          </p:nvPr>
+        </p:nvSpPr>
+        <p:spPr/>
+        <p:txBody>
+          <a:bodyPr/>
+          <a:lstStyle/>
+          <a:p>
+            <a:fld id="{13A72274-11AC-8C41-AE0A-D20F8A90A56D}" type="slidenum">
+              <a:rPr lang="en-US" smtClean="0"/>
+              <a:t>1</a:t>
+            </a:fld>
+            <a:endParaRPr lang="en-US"/>
+          </a:p>
+        </p:txBody>
+      </p:sp>
+    </p:spTree>
+    <p:extLst>
+      <p:ext uri="{BB962C8B-B14F-4D97-AF65-F5344CB8AC3E}">
+        <p14:creationId xmlns:p14="http://schemas.microsoft.com/office/powerpoint/2010/main" val="454911935"/>
+      </p:ext>
+    </p:extLst>
+  </p:cSld>
+  <p:clrMapOvr>
+    <a:masterClrMapping/>
+  </p:clrMapOvr>
+</p:notes>
+</file>
+
+<file path=ppt/notesSlides/notesSlide2.xml><?xml version="1.0" encoding="utf-8"?>
+<p:notes xmlns:a="http://schemas.openxmlformats.org/drawingml/2006/main" xmlns:r="http://schemas.openxmlformats.org/officeDocument/2006/relationships" xmlns:p="http://schemas.openxmlformats.org/presentationml/2006/main">
+  <p:cSld>
+    <p:spTree>
+      <p:nvGrpSpPr>
+        <p:cNvPr id="1" name=""/>
+        <p:cNvGrpSpPr/>
+        <p:nvPr/>
+      </p:nvGrpSpPr>
+      <p:grpSpPr>
+        <a:xfrm>
+          <a:off x="0" y="0"/>
+          <a:ext cx="0" cy="0"/>
+          <a:chOff x="0" y="0"/>
+          <a:chExt cx="0" cy="0"/>
+        </a:xfrm>
+      </p:grpSpPr>
+      <p:sp>
+        <p:nvSpPr>
+          <p:cNvPr id="2" name="Slide Image Placeholder 1"/>
+          <p:cNvSpPr>
+            <a:spLocks noGrp="1" noRot="1" noChangeAspect="1"/>
+          </p:cNvSpPr>
+          <p:nvPr>
+            <p:ph type="sldImg"/>
+          </p:nvPr>
+        </p:nvSpPr>
+        <p:spPr/>
+      </p:sp>
+      <p:sp>
+        <p:nvSpPr>
+          <p:cNvPr id="3" name="Notes Placeholder 2"/>
+          <p:cNvSpPr>
+            <a:spLocks noGrp="1"/>
+          </p:cNvSpPr>
+          <p:nvPr>
+            <p:ph type="body" idx="1"/>
+          </p:nvPr>
+        </p:nvSpPr>
+        <p:spPr/>
+        <p:txBody>
+          <a:bodyPr/>
+          <a:lstStyle/>
+          <a:p>
+            <a:endParaRPr lang="en-US"/>
+          </a:p>
+        </p:txBody>
+      </p:sp>
+      <p:sp>
+        <p:nvSpPr>
+          <p:cNvPr id="4" name="Slide Number Placeholder 3"/>
+          <p:cNvSpPr>
+            <a:spLocks noGrp="1"/>
+          </p:cNvSpPr>
+          <p:nvPr>
+            <p:ph type="sldNum" sz="quarter" idx="10"/>
+          </p:nvPr>
+        </p:nvSpPr>
+        <p:spPr/>
+        <p:txBody>
+          <a:bodyPr/>
+          <a:lstStyle/>
+          <a:p>
+            <a:fld id="{13A72274-11AC-8C41-AE0A-D20F8A90A56D}" type="slidenum">
+              <a:rPr lang="en-US" smtClean="0"/>
+              <a:t>2</a:t>
+            </a:fld>
+            <a:endParaRPr lang="en-US"/>
+          </a:p>
+        </p:txBody>
+      </p:sp>
+    </p:spTree>
+    <p:extLst>
+      <p:ext uri="{BB962C8B-B14F-4D97-AF65-F5344CB8AC3E}">
+        <p14:creationId xmlns:p14="http://schemas.microsoft.com/office/powerpoint/2010/main" val="619637756"/>
+      </p:ext>
+    </p:extLst>
+  </p:cSld>
+  <p:clrMapOvr>
+    <a:masterClrMapping/>
+  </p:clrMapOvr>
+</p:notes>
 </file>
 
 <file path=ppt/slideLayouts/slideLayout1.xml><?xml version="1.0" encoding="utf-8"?>
@@ -7683,7 +8203,7 @@
           <a:bodyPr/>
           <a:lstStyle/>
           <a:p>
-            <a:endParaRPr lang="en-US"/>
+            <a:endParaRPr lang="en-US" dirty="0"/>
           </a:p>
         </p:txBody>
       </p:sp>
@@ -7715,7 +8235,7 @@
           <p:nvPr/>
         </p:nvPicPr>
         <p:blipFill>
-          <a:blip r:embed="rId2"/>
+          <a:blip r:embed="rId3"/>
           <a:stretch>
             <a:fillRect/>
           </a:stretch>
@@ -8318,8 +8838,13 @@
           <a:p>
             <a:r>
               <a:rPr lang="en-US" dirty="0"/>
-              <a:t>Background</a:t>
-            </a:r>
+              <a:t>The Beer: </a:t>
+            </a:r>
+            <a:r>
+              <a:rPr lang="en-US" dirty="0" err="1"/>
+              <a:t>FrankenBeer</a:t>
+            </a:r>
+            <a:endParaRPr lang="en-US" dirty="0"/>
           </a:p>
         </p:txBody>
       </p:sp>
@@ -8335,58 +8860,67 @@
         </p:nvSpPr>
         <p:spPr>
           <a:xfrm>
-            <a:off x="123190" y="2188210"/>
-            <a:ext cx="6821805" cy="4507865"/>
-          </a:xfrm>
-        </p:spPr>
-        <p:txBody>
-          <a:bodyPr/>
+            <a:off x="680322" y="2336873"/>
+            <a:ext cx="6422844" cy="3599316"/>
+          </a:xfrm>
+        </p:spPr>
+        <p:txBody>
+          <a:bodyPr>
+            <a:normAutofit fontScale="92500" lnSpcReduction="10000"/>
+          </a:bodyPr>
           <a:lstStyle/>
           <a:p>
             <a:r>
-              <a:rPr lang="en-US" sz="2000" dirty="0">
-                <a:sym typeface="+mn-ea"/>
-              </a:rPr>
-              <a:t>There are more than 1200 beers in the 50 states (plus District of Columbia) of various ABV and IBU levels. Microbrewery presence varies as well from state to state. </a:t>
-            </a:r>
-          </a:p>
-          <a:p>
-            <a:endParaRPr lang="en-US" sz="2000"/>
-          </a:p>
-          <a:p>
-            <a:r>
-              <a:rPr lang="en-US" sz="2000"/>
-              <a:t>Our FrankenBeer has seen increasing sales since the initial roll out 2 years ago. FrankenBeer</a:t>
-            </a:r>
-            <a:r>
-              <a:rPr lang="en-US" sz="2000">
-                <a:sym typeface="+mn-ea"/>
-              </a:rPr>
-              <a:t> has garnered much acclaim in Seattle, Washington and Boulder, Colorado. From the feedback, there there is no other beer like it. </a:t>
-            </a:r>
-          </a:p>
-          <a:p>
-            <a:endParaRPr lang="en-US" sz="2000">
-              <a:sym typeface="+mn-ea"/>
-            </a:endParaRPr>
-          </a:p>
-          <a:p>
-            <a:r>
-              <a:rPr lang="en-US" sz="2000">
-                <a:sym typeface="+mn-ea"/>
-              </a:rPr>
-              <a:t>Many other established chains have requested we allow the beer to be produced and sold closer to their markets. </a:t>
-            </a:r>
-            <a:endParaRPr lang="en-US" sz="2000"/>
-          </a:p>
-          <a:p>
-            <a:endParaRPr lang="en-US" sz="2000"/>
+              <a:rPr lang="en-US" dirty="0" err="1"/>
+              <a:t>FrankenBeer</a:t>
+            </a:r>
+            <a:r>
+              <a:rPr lang="en-US" dirty="0"/>
+              <a:t> was created to address an ‘untapped’ demand for the crisp taste of high alcohol content beer without the bitterness that accompanies existing product offerings in this segment. </a:t>
+            </a:r>
+          </a:p>
+          <a:p>
+            <a:r>
+              <a:rPr lang="en-US" dirty="0"/>
+              <a:t>Our beer scientists have created a novel brewing technique enabling us to deliver 12% ABV at only 33 IBU’s.  </a:t>
+            </a:r>
+          </a:p>
+          <a:p>
+            <a:r>
+              <a:rPr lang="en-US" dirty="0"/>
+              <a:t>This process, Alcohol Bitterness Reduction &amp; Abatement (</a:t>
+            </a:r>
+            <a:r>
+              <a:rPr lang="en-US" dirty="0" err="1"/>
+              <a:t>ABRAcadabra</a:t>
+            </a:r>
+            <a:r>
+              <a:rPr lang="en-US" baseline="30000" dirty="0" err="1"/>
+              <a:t>TM</a:t>
+            </a:r>
+            <a:r>
+              <a:rPr lang="en-US" baseline="30000" dirty="0"/>
+              <a:t> </a:t>
+            </a:r>
+            <a:r>
+              <a:rPr lang="en-US" dirty="0"/>
+              <a:t>) has performed well with our dedicated team of full time tasters and test markets</a:t>
+            </a:r>
+          </a:p>
+          <a:p>
+            <a:endParaRPr lang="en-US" dirty="0"/>
           </a:p>
         </p:txBody>
       </p:sp>
       <p:pic>
         <p:nvPicPr>
-          <p:cNvPr id="5" name="Content Placeholder 3"/>
+          <p:cNvPr id="5" name="Picture 4">
+            <a:extLst>
+              <a:ext uri="{FF2B5EF4-FFF2-40B4-BE49-F238E27FC236}">
+                <a16:creationId xmlns:a16="http://schemas.microsoft.com/office/drawing/2014/main" id="{0C2158C5-EA90-0444-ACE2-C856EBB1F4EE}"/>
+              </a:ext>
+            </a:extLst>
+          </p:cNvPr>
           <p:cNvPicPr>
             <a:picLocks noChangeAspect="1"/>
           </p:cNvPicPr>
@@ -8400,8 +8934,8 @@
         </p:blipFill>
         <p:spPr>
           <a:xfrm>
-            <a:off x="7138035" y="2597150"/>
-            <a:ext cx="4900295" cy="3500120"/>
+            <a:off x="6920397" y="2677128"/>
+            <a:ext cx="5072822" cy="3432841"/>
           </a:xfrm>
           <a:prstGeom prst="rect">
             <a:avLst/>
@@ -8409,6 +8943,11 @@
         </p:spPr>
       </p:pic>
     </p:spTree>
+    <p:extLst>
+      <p:ext uri="{BB962C8B-B14F-4D97-AF65-F5344CB8AC3E}">
+        <p14:creationId xmlns:p14="http://schemas.microsoft.com/office/powerpoint/2010/main" val="1108247251"/>
+      </p:ext>
+    </p:extLst>
   </p:cSld>
   <p:clrMapOvr>
     <a:masterClrMapping/>
@@ -8450,7 +8989,7 @@
           <a:p>
             <a:r>
               <a:rPr lang="en-US" dirty="0"/>
-              <a:t>Problem Statement</a:t>
+              <a:t>Background</a:t>
             </a:r>
           </a:p>
         </p:txBody>
@@ -8462,104 +9001,84 @@
             <a:spLocks noGrp="1"/>
           </p:cNvSpPr>
           <p:nvPr>
-            <p:ph sz="half" idx="1"/>
-          </p:nvPr>
-        </p:nvSpPr>
-        <p:spPr>
-          <a:xfrm>
-            <a:off x="394970" y="2397760"/>
-            <a:ext cx="9694545" cy="3895090"/>
-          </a:xfrm>
-        </p:spPr>
-        <p:txBody>
-          <a:bodyPr>
-            <a:normAutofit/>
-          </a:bodyPr>
+            <p:ph idx="1"/>
+          </p:nvPr>
+        </p:nvSpPr>
+        <p:spPr>
+          <a:xfrm>
+            <a:off x="123190" y="2188210"/>
+            <a:ext cx="6821805" cy="4507865"/>
+          </a:xfrm>
+        </p:spPr>
+        <p:txBody>
+          <a:bodyPr/>
           <a:lstStyle/>
           <a:p>
-            <a:r>
-              <a:rPr lang="en-US" sz="2000" b="1" dirty="0">
-                <a:sym typeface="+mn-ea"/>
-              </a:rPr>
-              <a:t>Problem Statement:</a:t>
-            </a:r>
             <a:r>
               <a:rPr lang="en-US" sz="2000" dirty="0">
                 <a:sym typeface="+mn-ea"/>
               </a:rPr>
-              <a:t> Our </a:t>
-            </a:r>
-            <a:r>
-              <a:rPr lang="en-US" sz="2000" dirty="0" err="1">
+              <a:t>There are more than 1200 beers in the 50 states (plus District of Columbia) of various ABV and IBU levels. Microbrewery presence varies as well from state to state. </a:t>
+            </a:r>
+          </a:p>
+          <a:p>
+            <a:endParaRPr lang="en-US" sz="2000"/>
+          </a:p>
+          <a:p>
+            <a:r>
+              <a:rPr lang="en-US" sz="2000"/>
+              <a:t>Our FrankenBeer has seen increasing sales since the initial roll out 2 years ago. FrankenBeer</a:t>
+            </a:r>
+            <a:r>
+              <a:rPr lang="en-US" sz="2000">
                 <a:sym typeface="+mn-ea"/>
               </a:rPr>
-              <a:t>FrankenBeer</a:t>
-            </a:r>
-            <a:r>
-              <a:rPr lang="en-US" sz="2000" dirty="0">
+              <a:t> has garnered much acclaim in Seattle, Washington and Boulder, Colorado. From the feedback, there there is no other beer like it. </a:t>
+            </a:r>
+          </a:p>
+          <a:p>
+            <a:endParaRPr lang="en-US" sz="2000">
+              <a:sym typeface="+mn-ea"/>
+            </a:endParaRPr>
+          </a:p>
+          <a:p>
+            <a:r>
+              <a:rPr lang="en-US" sz="2000">
                 <a:sym typeface="+mn-ea"/>
               </a:rPr>
-              <a:t> has distinct qualities that make it appealing to many demographics of beer drinkers. This indicates that a thorough analysis must be done to target receptive markets. </a:t>
-            </a:r>
-          </a:p>
-          <a:p>
-            <a:pPr marL="0" indent="0">
-              <a:buNone/>
-            </a:pPr>
-            <a:endParaRPr lang="en-US" sz="2000" dirty="0">
-              <a:sym typeface="+mn-ea"/>
-            </a:endParaRPr>
-          </a:p>
-          <a:p>
-            <a:r>
-              <a:rPr lang="en-US" sz="2000" b="1" dirty="0"/>
-              <a:t>Current Condition: </a:t>
-            </a:r>
-            <a:r>
-              <a:rPr lang="en-US" sz="2000" dirty="0"/>
-              <a:t>Our </a:t>
-            </a:r>
-            <a:r>
-              <a:rPr lang="en-US" sz="2000" dirty="0" err="1"/>
-              <a:t>FrankenBeer</a:t>
-            </a:r>
-            <a:r>
-              <a:rPr lang="en-US" sz="2000" dirty="0"/>
-              <a:t> is a 12% ABV with a 33 IBU. It has tested well in the Seattle, Washington and Boulder, Colorado markets.</a:t>
-            </a:r>
-          </a:p>
-          <a:p>
-            <a:pPr marL="0" indent="0">
-              <a:buNone/>
-            </a:pPr>
-            <a:endParaRPr lang="en-US" sz="2000" dirty="0"/>
-          </a:p>
-          <a:p>
-            <a:r>
-              <a:rPr lang="en-US" sz="2000" b="1" dirty="0"/>
-              <a:t>Target Condition: </a:t>
-            </a:r>
-            <a:r>
-              <a:rPr lang="en-US" sz="2000" dirty="0"/>
-              <a:t>Expand the </a:t>
-            </a:r>
-            <a:r>
-              <a:rPr lang="en-US" sz="2000" dirty="0" err="1"/>
-              <a:t>FrankenBeer</a:t>
-            </a:r>
-            <a:r>
-              <a:rPr lang="en-US" sz="2000" dirty="0"/>
-              <a:t> to three new markets.</a:t>
-            </a:r>
-          </a:p>
-          <a:p>
-            <a:pPr marL="0" indent="0">
-              <a:buNone/>
-            </a:pPr>
-            <a:endParaRPr lang="en-US" sz="2000" dirty="0"/>
-          </a:p>
-        </p:txBody>
-      </p:sp>
+              <a:t>Many other established chains have requested we allow the beer to be produced and sold closer to their markets. </a:t>
+            </a:r>
+            <a:endParaRPr lang="en-US" sz="2000"/>
+          </a:p>
+          <a:p>
+            <a:endParaRPr lang="en-US" sz="2000"/>
+          </a:p>
+        </p:txBody>
+      </p:sp>
+      <p:pic>
+        <p:nvPicPr>
+          <p:cNvPr id="5" name="Content Placeholder 3"/>
+          <p:cNvPicPr>
+            <a:picLocks noChangeAspect="1"/>
+          </p:cNvPicPr>
+          <p:nvPr/>
+        </p:nvPicPr>
+        <p:blipFill>
+          <a:blip r:embed="rId2"/>
+          <a:stretch>
+            <a:fillRect/>
+          </a:stretch>
+        </p:blipFill>
+        <p:spPr>
+          <a:xfrm>
+            <a:off x="7138035" y="2597150"/>
+            <a:ext cx="4900295" cy="3500120"/>
+          </a:xfrm>
+          <a:prstGeom prst="rect">
+            <a:avLst/>
+          </a:prstGeom>
+        </p:spPr>
+      </p:pic>
     </p:spTree>
   </p:cSld>
   <p:clrMapOvr>
@@ -8602,70 +9121,113 @@
           <a:p>
             <a:r>
               <a:rPr lang="en-US" dirty="0"/>
-              <a:t>The Beer: </a:t>
-            </a:r>
-            <a:r>
-              <a:rPr lang="en-US" dirty="0" err="1"/>
+              <a:t>Problem Statement</a:t>
+            </a:r>
+          </a:p>
+        </p:txBody>
+      </p:sp>
+      <p:sp>
+        <p:nvSpPr>
+          <p:cNvPr id="3" name="Content Placeholder 2"/>
+          <p:cNvSpPr>
+            <a:spLocks noGrp="1"/>
+          </p:cNvSpPr>
+          <p:nvPr>
+            <p:ph sz="half" idx="1"/>
+          </p:nvPr>
+        </p:nvSpPr>
+        <p:spPr>
+          <a:xfrm>
+            <a:off x="394970" y="2397760"/>
+            <a:ext cx="9694545" cy="3895090"/>
+          </a:xfrm>
+        </p:spPr>
+        <p:txBody>
+          <a:bodyPr>
+            <a:normAutofit/>
+          </a:bodyPr>
+          <a:lstStyle/>
+          <a:p>
+            <a:r>
+              <a:rPr lang="en-US" sz="2000" b="1" dirty="0">
+                <a:sym typeface="+mn-ea"/>
+              </a:rPr>
+              <a:t>Problem Statement:</a:t>
+            </a:r>
+            <a:r>
+              <a:rPr lang="en-US" sz="2000" dirty="0">
+                <a:sym typeface="+mn-ea"/>
+              </a:rPr>
+              <a:t> Our </a:t>
+            </a:r>
+            <a:r>
+              <a:rPr lang="en-US" sz="2000" dirty="0" err="1">
+                <a:sym typeface="+mn-ea"/>
+              </a:rPr>
               <a:t>FrankenBeer</a:t>
             </a:r>
-            <a:endParaRPr lang="en-US" dirty="0"/>
-          </a:p>
-        </p:txBody>
-      </p:sp>
-      <p:sp>
-        <p:nvSpPr>
-          <p:cNvPr id="3" name="Content Placeholder 2"/>
-          <p:cNvSpPr>
-            <a:spLocks noGrp="1"/>
-          </p:cNvSpPr>
-          <p:nvPr>
-            <p:ph idx="1"/>
-          </p:nvPr>
-        </p:nvSpPr>
-        <p:spPr/>
-        <p:txBody>
-          <a:bodyPr/>
-          <a:lstStyle/>
-          <a:p>
-            <a:r>
-              <a:rPr lang="en-US" dirty="0" err="1"/>
+            <a:r>
+              <a:rPr lang="en-US" sz="2000" dirty="0">
+                <a:sym typeface="+mn-ea"/>
+              </a:rPr>
+              <a:t> has distinct qualities that make it appealing to many demographics of beer drinkers. This indicates that a thorough analysis must be done to target receptive markets. </a:t>
+            </a:r>
+          </a:p>
+          <a:p>
+            <a:pPr marL="0" indent="0">
+              <a:buNone/>
+            </a:pPr>
+            <a:endParaRPr lang="en-US" sz="2000" dirty="0">
+              <a:sym typeface="+mn-ea"/>
+            </a:endParaRPr>
+          </a:p>
+          <a:p>
+            <a:r>
+              <a:rPr lang="en-US" sz="2000" b="1" dirty="0"/>
+              <a:t>Current Condition: </a:t>
+            </a:r>
+            <a:r>
+              <a:rPr lang="en-US" sz="2000" dirty="0"/>
+              <a:t>Our </a:t>
+            </a:r>
+            <a:r>
+              <a:rPr lang="en-US" sz="2000" dirty="0" err="1"/>
               <a:t>FrankenBeer</a:t>
             </a:r>
             <a:r>
-              <a:rPr lang="en-US" dirty="0"/>
-              <a:t> was created to address an ‘untapped’ demand for the crisp taste of high alcohol content beer without the bitterness that accompanies existing product offerings in this segment. </a:t>
-            </a:r>
-          </a:p>
-          <a:p>
-            <a:r>
-              <a:rPr lang="en-US" dirty="0"/>
-              <a:t>Our beer scientists have created a novel brewing technique enabling us to deliver 12% ABV at only 33 IBU’s.  </a:t>
-            </a:r>
-          </a:p>
-          <a:p>
-            <a:r>
-              <a:rPr lang="en-US" dirty="0"/>
-              <a:t>This process, Alcohol Bitterness Reduction &amp; Abatement (</a:t>
-            </a:r>
-            <a:r>
-              <a:rPr lang="en-US" dirty="0" err="1"/>
-              <a:t>ABRAcadabra</a:t>
-            </a:r>
-            <a:r>
-              <a:rPr lang="en-US" baseline="30000" dirty="0" err="1"/>
-              <a:t>TM</a:t>
-            </a:r>
-            <a:r>
-              <a:rPr lang="en-US" baseline="30000" dirty="0"/>
-              <a:t> </a:t>
-            </a:r>
-            <a:r>
-              <a:rPr lang="en-US" dirty="0"/>
-              <a:t>) has performed well with our dedicated team of full time taste testers and test markets</a:t>
-            </a:r>
-          </a:p>
-          <a:p>
-            <a:endParaRPr lang="en-US" dirty="0"/>
+              <a:rPr lang="en-US" sz="2000" dirty="0"/>
+              <a:t> is a 12% ABV with a 33 IBU. It has tested well in the Seattle, Washington and Boulder, Colorado markets.</a:t>
+            </a:r>
+          </a:p>
+          <a:p>
+            <a:pPr marL="0" indent="0">
+              <a:buNone/>
+            </a:pPr>
+            <a:endParaRPr lang="en-US" sz="2000" dirty="0"/>
+          </a:p>
+          <a:p>
+            <a:r>
+              <a:rPr lang="en-US" sz="2000" b="1" dirty="0"/>
+              <a:t>Target Condition: </a:t>
+            </a:r>
+            <a:r>
+              <a:rPr lang="en-US" sz="2000" dirty="0"/>
+              <a:t>Expand the </a:t>
+            </a:r>
+            <a:r>
+              <a:rPr lang="en-US" sz="2000" dirty="0" err="1"/>
+              <a:t>FrankenBeer</a:t>
+            </a:r>
+            <a:r>
+              <a:rPr lang="en-US" sz="2000" dirty="0"/>
+              <a:t> to three new markets.</a:t>
+            </a:r>
+          </a:p>
+          <a:p>
+            <a:pPr marL="0" indent="0">
+              <a:buNone/>
+            </a:pPr>
+            <a:endParaRPr lang="en-US" sz="2000" dirty="0"/>
           </a:p>
         </p:txBody>
       </p:sp>
@@ -8768,7 +9330,19 @@
               <a:rPr lang="en-US" sz="2000" dirty="0">
                 <a:sym typeface="+mn-ea"/>
               </a:rPr>
-              <a:t>Colorado already has the highest ABV craft beer in the country--Lee Hill Series Vol. 5 - Belgian Style Quadrupel Ale (ABV 12.8%)</a:t>
+              <a:t>Colorado already has the highest ABV craft beer in the country--Lee Hill Series Vol. 5 - Belgian Style </a:t>
+            </a:r>
+            <a:r>
+              <a:rPr lang="en-US" sz="2000" dirty="0" err="1">
+                <a:sym typeface="+mn-ea"/>
+              </a:rPr>
+              <a:t>Quadrupel</a:t>
+            </a:r>
+            <a:r>
+              <a:rPr lang="en-US" sz="2000" dirty="0">
+                <a:sym typeface="+mn-ea"/>
+              </a:rPr>
+              <a:t> Ale (ABV 12.8%)</a:t>
             </a:r>
           </a:p>
           <a:p>
@@ -9936,4 +10510,299 @@
     </a:ext>
   </a:extLst>
 </a:theme>
+</file>
+
+<file path=ppt/theme/theme2.xml><?xml version="1.0" encoding="utf-8"?>
+<a:theme xmlns:a="http://schemas.openxmlformats.org/drawingml/2006/main" name="Office Theme">
+  <a:themeElements>
+    <a:clrScheme name="Office">
+      <a:dk1>
+        <a:sysClr val="windowText" lastClr="000000"/>
+      </a:dk1>
+      <a:lt1>
+        <a:sysClr val="window" lastClr="FFFFFF"/>
+      </a:lt1>
+      <a:dk2>
+        <a:srgbClr val="44546A"/>
+      </a:dk2>
+      <a:lt2>
+        <a:srgbClr val="E7E6E6"/>
+      </a:lt2>
+      <a:accent1>
+        <a:srgbClr val="4472C4"/>
+      </a:accent1>
+      <a:accent2>
+        <a:srgbClr val="ED7D31"/>
+      </a:accent2>
+      <a:accent3>
+        <a:srgbClr val="A5A5A5"/>
+      </a:accent3>
+      <a:accent4>
+        <a:srgbClr val="FFC000"/>
+      </a:accent4>
+      <a:accent5>
+        <a:srgbClr val="5B9BD5"/>
+      </a:accent5>
+      <a:accent6>
+        <a:srgbClr val="70AD47"/>
+      </a:accent6>
+      <a:hlink>
+        <a:srgbClr val="0563C1"/>
+      </a:hlink>
+      <a:folHlink>
+        <a:srgbClr val="954F72"/>
+      </a:folHlink>
+    </a:clrScheme>
+    <a:fontScheme name="Office">
+      <a:majorFont>
+        <a:latin typeface="Calibri Light" panose="020F0302020204030204"/>
+        <a:ea typeface=""/>
+        <a:cs typeface=""/>
+        <a:font script="Jpan" typeface="游ゴシック Light"/>
+        <a:font script="Hang" typeface="맑은 고딕"/>
+        <a:font script="Hans" typeface="等线 Light"/>
+        <a:font script="Hant" typeface="新細明體"/>
+        <a:font script="Arab" typeface="Times New Roman"/>
+        <a:font script="Hebr" typeface="Times New Roman"/>
+        <a:font script="Thai" typeface="Angsana New"/>
+        <a:font script="Ethi" typeface="Nyala"/>
+        <a:font script="Beng" typeface="Vrinda"/>
+        <a:font script="Gujr" typeface="Shruti"/>
+        <a:font script="Khmr" typeface="MoolBoran"/>
+        <a:font script="Knda" typeface="Tunga"/>
+        <a:font script="Guru" typeface="Raavi"/>
+        <a:font script="Cans" typeface="Euphemia"/>
+        <a:font script="Cher" typeface="Plantagenet Cherokee"/>
+        <a:font script="Yiii" typeface="Microsoft Yi Baiti"/>
+        <a:font script="Tibt" typeface="Microsoft Himalaya"/>
+        <a:font script="Thaa" typeface="MV Boli"/>
+        <a:font script="Deva" typeface="Mangal"/>
+        <a:font script="Telu" typeface="Gautami"/>
+        <a:font script="Taml" typeface="Latha"/>
+        <a:font script="Syrc" typeface="Estrangelo Edessa"/>
+        <a:font script="Orya" typeface="Kalinga"/>
+        <a:font script="Mlym" typeface="Kartika"/>
+        <a:font script="Laoo" typeface="DokChampa"/>
+        <a:font script="Sinh" typeface="Iskoola Pota"/>
+        <a:font script="Mong" typeface="Mongolian Baiti"/>
+        <a:font script="Viet" typeface="Times New Roman"/>
+        <a:font script="Uigh" typeface="Microsoft Uighur"/>
+        <a:font script="Geor" typeface="Sylfaen"/>
+        <a:font script="Armn" typeface="Arial"/>
+        <a:font script="Bugi" typeface="Leelawadee UI"/>
+        <a:font script="Bopo" typeface="Microsoft JhengHei"/>
+        <a:font script="Java" typeface="Javanese Text"/>
+        <a:font script="Lisu" typeface="Segoe UI"/>
+        <a:font script="Mymr" typeface="Myanmar Text"/>
+        <a:font script="Nkoo" typeface="Ebrima"/>
+        <a:font script="Olck" typeface="Nirmala UI"/>
+        <a:font script="Osma" typeface="Ebrima"/>
+        <a:font script="Phag" typeface="Phagspa"/>
+        <a:font script="Syrn" typeface="Estrangelo Edessa"/>
+        <a:font script="Syrj" typeface="Estrangelo Edessa"/>
+        <a:font script="Syre" typeface="Estrangelo Edessa"/>
+        <a:font script="Sora" typeface="Nirmala UI"/>
+        <a:font script="Tale" typeface="Microsoft Tai Le"/>
+        <a:font script="Talu" typeface="Microsoft New Tai Lue"/>
+        <a:font script="Tfng" typeface="Ebrima"/>
+      </a:majorFont>
+      <a:minorFont>
+        <a:latin typeface="Calibri" panose="020F0502020204030204"/>
+        <a:ea typeface=""/>
+        <a:cs typeface=""/>
+        <a:font script="Jpan" typeface="游ゴシック"/>
+        <a:font script="Hang" typeface="맑은 고딕"/>
+        <a:font script="Hans" typeface="等线"/>
+        <a:font script="Hant" typeface="新細明體"/>
+        <a:font script="Arab" typeface="Arial"/>
+        <a:font script="Hebr" typeface="Arial"/>
+        <a:font script="Thai" typeface="Cordia New"/>
+        <a:font script="Ethi" typeface="Nyala"/>
+        <a:font script="Beng" typeface="Vrinda"/>
+        <a:font script="Gujr" typeface="Shruti"/>
+        <a:font script="Khmr" typeface="DaunPenh"/>
+        <a:font script="Knda" typeface="Tunga"/>
+        <a:font script="Guru" typeface="Raavi"/>
+        <a:font script="Cans" typeface="Euphemia"/>
+        <a:font script="Cher" typeface="Plantagenet Cherokee"/>
+        <a:font script="Yiii" typeface="Microsoft Yi Baiti"/>
+        <a:font script="Tibt" typeface="Microsoft Himalaya"/>
+        <a:font script="Thaa" typeface="MV Boli"/>
+        <a:font script="Deva" typeface="Mangal"/>
+        <a:font script="Telu" typeface="Gautami"/>
+        <a:font script="Taml" typeface="Latha"/>
+        <a:font script="Syrc" typeface="Estrangelo Edessa"/>
+        <a:font script="Orya" typeface="Kalinga"/>
+        <a:font script="Mlym" typeface="Kartika"/>
+        <a:font script="Laoo" typeface="DokChampa"/>
+        <a:font script="Sinh" typeface="Iskoola Pota"/>
+        <a:font script="Mong" typeface="Mongolian Baiti"/>
+        <a:font script="Viet" typeface="Arial"/>
+        <a:font script="Uigh" typeface="Microsoft Uighur"/>
+        <a:font script="Geor" typeface="Sylfaen"/>
+        <a:font script="Armn" typeface="Arial"/>
+        <a:font script="Bugi" typeface="Leelawadee UI"/>
+        <a:font script="Bopo" typeface="Microsoft JhengHei"/>
+        <a:font script="Java" typeface="Javanese Text"/>
+        <a:font script="Lisu" typeface="Segoe UI"/>
+        <a:font script="Mymr" typeface="Myanmar Text"/>
+        <a:font script="Nkoo" typeface="Ebrima"/>
+        <a:font script="Olck" typeface="Nirmala UI"/>
+        <a:font script="Osma" typeface="Ebrima"/>
+        <a:font script="Phag" typeface="Phagspa"/>
+        <a:font script="Syrn" typeface="Estrangelo Edessa"/>
+        <a:font script="Syrj" typeface="Estrangelo Edessa"/>
+        <a:font script="Syre" typeface="Estrangelo Edessa"/>
+        <a:font script="Sora" typeface="Nirmala UI"/>
+        <a:font script="Tale" typeface="Microsoft Tai Le"/>
+        <a:font script="Talu" typeface="Microsoft New Tai Lue"/>
+        <a:font script="Tfng" typeface="Ebrima"/>
+      </a:minorFont>
+    </a:fontScheme>
+    <a:fmtScheme name="Office">
+      <a:fillStyleLst>
+        <a:solidFill>
+          <a:schemeClr val="phClr"/>
+        </a:solidFill>
+        <a:gradFill rotWithShape="1">
+          <a:gsLst>
+            <a:gs pos="0">
+              <a:schemeClr val="phClr">
+                <a:lumMod val="110000"/>
+                <a:satMod val="105000"/>
+                <a:tint val="67000"/>
+              </a:schemeClr>
+            </a:gs>
+            <a:gs pos="50000">
+              <a:schemeClr val="phClr">
+                <a:lumMod val="105000"/>
+                <a:satMod val="103000"/>
+                <a:tint val="73000"/>
+              </a:schemeClr>
+            </a:gs>
+            <a:gs pos="100000">
+              <a:schemeClr val="phClr">
+                <a:lumMod val="105000"/>
+                <a:satMod val="109000"/>
+                <a:tint val="81000"/>
+              </a:schemeClr>
+            </a:gs>
+          </a:gsLst>
+          <a:lin ang="5400000" scaled="0"/>
+        </a:gradFill>
+        <a:gradFill rotWithShape="1">
+          <a:gsLst>
+            <a:gs pos="0">
+              <a:schemeClr val="phClr">
+                <a:satMod val="103000"/>
+                <a:lumMod val="102000"/>
+                <a:tint val="94000"/>
+              </a:schemeClr>
+            </a:gs>
+            <a:gs pos="50000">
+              <a:schemeClr val="phClr">
+                <a:satMod val="110000"/>
+                <a:lumMod val="100000"/>
+                <a:shade val="100000"/>
+              </a:schemeClr>
+            </a:gs>
+            <a:gs pos="100000">
+              <a:schemeClr val="phClr">
+                <a:lumMod val="99000"/>
+                <a:satMod val="120000"/>
+                <a:shade val="78000"/>
+              </a:schemeClr>
+            </a:gs>
+          </a:gsLst>
+          <a:lin ang="5400000" scaled="0"/>
+        </a:gradFill>
+      </a:fillStyleLst>
+      <a:lnStyleLst>
+        <a:ln w="6350" cap="flat" cmpd="sng" algn="ctr">
+          <a:solidFill>
+            <a:schemeClr val="phClr"/>
+          </a:solidFill>
+          <a:prstDash val="solid"/>
+          <a:miter lim="800000"/>
+        </a:ln>
+        <a:ln w="12700" cap="flat" cmpd="sng" algn="ctr">
+          <a:solidFill>
+            <a:schemeClr val="phClr"/>
+          </a:solidFill>
+          <a:prstDash val="solid"/>
+          <a:miter lim="800000"/>
+        </a:ln>
+        <a:ln w="19050" cap="flat" cmpd="sng" algn="ctr">
+          <a:solidFill>
+            <a:schemeClr val="phClr"/>
+          </a:solidFill>
+          <a:prstDash val="solid"/>
+          <a:miter lim="800000"/>
+        </a:ln>
+      </a:lnStyleLst>
+      <a:effectStyleLst>
+        <a:effectStyle>
+          <a:effectLst/>
+        </a:effectStyle>
+        <a:effectStyle>
+          <a:effectLst/>
+        </a:effectStyle>
+        <a:effectStyle>
+          <a:effectLst>
+            <a:outerShdw blurRad="57150" dist="19050" dir="5400000" algn="ctr" rotWithShape="0">
+              <a:srgbClr val="000000">
+                <a:alpha val="63000"/>
+              </a:srgbClr>
+            </a:outerShdw>
+          </a:effectLst>
+        </a:effectStyle>
+      </a:effectStyleLst>
+      <a:bgFillStyleLst>
+        <a:solidFill>
+          <a:schemeClr val="phClr"/>
+        </a:solidFill>
+        <a:solidFill>
+          <a:schemeClr val="phClr">
+            <a:tint val="95000"/>
+            <a:satMod val="170000"/>
+          </a:schemeClr>
+        </a:solidFill>
+        <a:gradFill rotWithShape="1">
+          <a:gsLst>
+            <a:gs pos="0">
+              <a:schemeClr val="phClr">
+                <a:tint val="93000"/>
+                <a:satMod val="150000"/>
+                <a:shade val="98000"/>
+                <a:lumMod val="102000"/>
+              </a:schemeClr>
+            </a:gs>
+            <a:gs pos="50000">
+              <a:schemeClr val="phClr">
+                <a:tint val="98000"/>
+                <a:satMod val="130000"/>
+                <a:shade val="90000"/>
+                <a:lumMod val="103000"/>
+              </a:schemeClr>
+            </a:gs>
+            <a:gs pos="100000">
+              <a:schemeClr val="phClr">
+                <a:shade val="63000"/>
+                <a:satMod val="120000"/>
+              </a:schemeClr>
+            </a:gs>
+          </a:gsLst>
+          <a:lin ang="5400000" scaled="0"/>
+        </a:gradFill>
+      </a:bgFillStyleLst>
+    </a:fmtScheme>
+  </a:themeElements>
+  <a:objectDefaults/>
+  <a:extraClrSchemeLst/>
+  <a:extLst>
+    <a:ext uri="{05A4C25C-085E-4340-85A3-A5531E510DB2}">
+      <thm15:themeFamily xmlns:thm15="http://schemas.microsoft.com/office/thememl/2012/main" name="Office Theme" id="{62F939B6-93AF-4DB8-9C6B-D6C7DFDC589F}" vid="{4A3C46E8-61CC-4603-A589-7422A47A8E4A}"/>
+    </a:ext>
+  </a:extLst>
+</a:theme>
 </file>
</xml_diff>

<commit_message>
More wording a ordering changes
</commit_message>
<xml_diff>
--- a/Case Study - Project 1 - Final.pptx
+++ b/Case Study - Project 1 - Final.pptx
@@ -11,8 +11,8 @@
     <p:sldId id="256" r:id="rId2"/>
     <p:sldId id="266" r:id="rId3"/>
     <p:sldId id="257" r:id="rId4"/>
-    <p:sldId id="279" r:id="rId5"/>
-    <p:sldId id="259" r:id="rId6"/>
+    <p:sldId id="259" r:id="rId5"/>
+    <p:sldId id="279" r:id="rId6"/>
     <p:sldId id="258" r:id="rId7"/>
     <p:sldId id="262" r:id="rId8"/>
     <p:sldId id="263" r:id="rId9"/>
@@ -8600,7 +8600,9 @@
           </a:xfrm>
         </p:spPr>
         <p:txBody>
-          <a:bodyPr/>
+          <a:bodyPr>
+            <a:normAutofit/>
+          </a:bodyPr>
           <a:lstStyle/>
           <a:p>
             <a:r>
@@ -8611,21 +8613,25 @@
           <a:p>
             <a:r>
               <a:rPr lang="en-US" dirty="0"/>
-              <a:t>Background</a:t>
+              <a:t>Market Backdrop</a:t>
             </a:r>
           </a:p>
           <a:p>
             <a:r>
               <a:rPr lang="en-US" dirty="0"/>
-              <a:t>Problem Statement</a:t>
-            </a:r>
-          </a:p>
-          <a:p>
+              <a:t>Meet </a:t>
+            </a:r>
             <a:r>
               <a:rPr lang="en-US" dirty="0" err="1"/>
               <a:t>FrankenBeer</a:t>
             </a:r>
             <a:endParaRPr lang="en-US" dirty="0"/>
+          </a:p>
+          <a:p>
+            <a:r>
+              <a:rPr lang="en-US" dirty="0"/>
+              <a:t>Where do we go from here? </a:t>
+            </a:r>
           </a:p>
           <a:p>
             <a:r>
@@ -8728,6 +8734,13 @@
             <a:pPr lvl="1"/>
             <a:r>
               <a:rPr lang="en-US" dirty="0"/>
+              <a:t>Nick Cellini</a:t>
+            </a:r>
+          </a:p>
+          <a:p>
+            <a:pPr lvl="1"/>
+            <a:r>
+              <a:rPr lang="en-US" dirty="0"/>
               <a:t>Chris Graves</a:t>
             </a:r>
           </a:p>
@@ -8736,13 +8749,6 @@
             <a:r>
               <a:rPr lang="en-US" dirty="0"/>
               <a:t>Heber Nielsen</a:t>
-            </a:r>
-          </a:p>
-          <a:p>
-            <a:pPr lvl="1"/>
-            <a:r>
-              <a:rPr lang="en-US" dirty="0"/>
-              <a:t>Nick Cellini</a:t>
             </a:r>
           </a:p>
           <a:p>
@@ -8838,13 +8844,8 @@
           <a:p>
             <a:r>
               <a:rPr lang="en-US" dirty="0"/>
-              <a:t>The Beer: </a:t>
-            </a:r>
-            <a:r>
-              <a:rPr lang="en-US" dirty="0" err="1"/>
-              <a:t>FrankenBeer</a:t>
-            </a:r>
-            <a:endParaRPr lang="en-US" dirty="0"/>
+              <a:t>Market Backdrop</a:t>
+            </a:r>
           </a:p>
         </p:txBody>
       </p:sp>
@@ -8860,67 +8861,53 @@
         </p:nvSpPr>
         <p:spPr>
           <a:xfrm>
-            <a:off x="680322" y="2336873"/>
-            <a:ext cx="6422844" cy="3599316"/>
+            <a:off x="123190" y="2188210"/>
+            <a:ext cx="6821805" cy="4507865"/>
           </a:xfrm>
         </p:spPr>
         <p:txBody>
           <a:bodyPr>
-            <a:normAutofit fontScale="92500" lnSpcReduction="10000"/>
+            <a:normAutofit/>
           </a:bodyPr>
           <a:lstStyle/>
           <a:p>
             <a:r>
-              <a:rPr lang="en-US" dirty="0" err="1"/>
-              <a:t>FrankenBeer</a:t>
-            </a:r>
-            <a:r>
-              <a:rPr lang="en-US" dirty="0"/>
-              <a:t> was created to address an ‘untapped’ demand for the crisp taste of high alcohol content beer without the bitterness that accompanies existing product offerings in this segment. </a:t>
-            </a:r>
-          </a:p>
-          <a:p>
-            <a:r>
-              <a:rPr lang="en-US" dirty="0"/>
-              <a:t>Our beer scientists have created a novel brewing technique enabling us to deliver 12% ABV at only 33 IBU’s.  </a:t>
-            </a:r>
-          </a:p>
-          <a:p>
-            <a:r>
-              <a:rPr lang="en-US" dirty="0"/>
-              <a:t>This process, Alcohol Bitterness Reduction &amp; Abatement (</a:t>
-            </a:r>
-            <a:r>
-              <a:rPr lang="en-US" dirty="0" err="1"/>
-              <a:t>ABRAcadabra</a:t>
-            </a:r>
-            <a:r>
-              <a:rPr lang="en-US" baseline="30000" dirty="0" err="1"/>
-              <a:t>TM</a:t>
-            </a:r>
-            <a:r>
-              <a:rPr lang="en-US" baseline="30000" dirty="0"/>
-              <a:t> </a:t>
-            </a:r>
-            <a:r>
-              <a:rPr lang="en-US" dirty="0"/>
-              <a:t>) has performed well with our dedicated team of full time tasters and test markets</a:t>
-            </a:r>
-          </a:p>
-          <a:p>
-            <a:endParaRPr lang="en-US" dirty="0"/>
+              <a:rPr lang="en-US" sz="2000" dirty="0">
+                <a:sym typeface="+mn-ea"/>
+              </a:rPr>
+              <a:t>The crowded Microbrew landscape continues to expand with 558 Breweries offering a proliferating selection of 2,410 beers across the domestic US market</a:t>
+            </a:r>
+          </a:p>
+          <a:p>
+            <a:endParaRPr lang="en-US" sz="2000" dirty="0"/>
+          </a:p>
+          <a:p>
+            <a:r>
+              <a:rPr lang="en-US" sz="2000" dirty="0">
+                <a:sym typeface="+mn-ea"/>
+              </a:rPr>
+              <a:t>The distribution of Breweries by state is highly variable with concentrations in Colorado, California, and Michigan - homes of “old guard” national brands and brews</a:t>
+            </a:r>
+          </a:p>
+          <a:p>
+            <a:endParaRPr lang="en-US" sz="2000" dirty="0">
+              <a:sym typeface="+mn-ea"/>
+            </a:endParaRPr>
+          </a:p>
+          <a:p>
+            <a:r>
+              <a:rPr lang="en-US" sz="2000" dirty="0">
+                <a:sym typeface="+mn-ea"/>
+              </a:rPr>
+              <a:t>While median alcohol content (ABV) is solidly clustered in the 5% to 6% range across markets, bitterness (IBU) is much more variable</a:t>
+            </a:r>
+            <a:endParaRPr lang="en-US" sz="2000" dirty="0"/>
           </a:p>
         </p:txBody>
       </p:sp>
       <p:pic>
         <p:nvPicPr>
-          <p:cNvPr id="5" name="Picture 4">
-            <a:extLst>
-              <a:ext uri="{FF2B5EF4-FFF2-40B4-BE49-F238E27FC236}">
-                <a16:creationId xmlns:a16="http://schemas.microsoft.com/office/drawing/2014/main" id="{0C2158C5-EA90-0444-ACE2-C856EBB1F4EE}"/>
-              </a:ext>
-            </a:extLst>
-          </p:cNvPr>
+          <p:cNvPr id="5" name="Content Placeholder 3"/>
           <p:cNvPicPr>
             <a:picLocks noChangeAspect="1"/>
           </p:cNvPicPr>
@@ -8934,20 +8921,75 @@
         </p:blipFill>
         <p:spPr>
           <a:xfrm>
-            <a:off x="6920397" y="2677128"/>
-            <a:ext cx="5072822" cy="3432841"/>
+            <a:off x="6993541" y="2076886"/>
+            <a:ext cx="2742384" cy="1958795"/>
           </a:xfrm>
           <a:prstGeom prst="rect">
             <a:avLst/>
           </a:prstGeom>
         </p:spPr>
       </p:pic>
+      <p:pic>
+        <p:nvPicPr>
+          <p:cNvPr id="6" name="Picture 5">
+            <a:extLst>
+              <a:ext uri="{FF2B5EF4-FFF2-40B4-BE49-F238E27FC236}">
+                <a16:creationId xmlns:a16="http://schemas.microsoft.com/office/drawing/2014/main" id="{A886447B-E543-5649-8613-F354C16EF1BD}"/>
+              </a:ext>
+            </a:extLst>
+          </p:cNvPr>
+          <p:cNvPicPr>
+            <a:picLocks noChangeAspect="1"/>
+          </p:cNvPicPr>
+          <p:nvPr/>
+        </p:nvPicPr>
+        <p:blipFill>
+          <a:blip r:embed="rId3"/>
+          <a:stretch>
+            <a:fillRect/>
+          </a:stretch>
+        </p:blipFill>
+        <p:spPr>
+          <a:xfrm>
+            <a:off x="9498929" y="3621240"/>
+            <a:ext cx="2643740" cy="1910015"/>
+          </a:xfrm>
+          <a:prstGeom prst="rect">
+            <a:avLst/>
+          </a:prstGeom>
+        </p:spPr>
+      </p:pic>
+      <p:pic>
+        <p:nvPicPr>
+          <p:cNvPr id="8" name="Picture 7">
+            <a:extLst>
+              <a:ext uri="{FF2B5EF4-FFF2-40B4-BE49-F238E27FC236}">
+                <a16:creationId xmlns:a16="http://schemas.microsoft.com/office/drawing/2014/main" id="{069C4DF6-A4B0-404A-ABA4-A9CC7F8306E4}"/>
+              </a:ext>
+            </a:extLst>
+          </p:cNvPr>
+          <p:cNvPicPr>
+            <a:picLocks noChangeAspect="1"/>
+          </p:cNvPicPr>
+          <p:nvPr/>
+        </p:nvPicPr>
+        <p:blipFill>
+          <a:blip r:embed="rId4"/>
+          <a:stretch>
+            <a:fillRect/>
+          </a:stretch>
+        </p:blipFill>
+        <p:spPr>
+          <a:xfrm>
+            <a:off x="6993541" y="4804603"/>
+            <a:ext cx="2611055" cy="1891472"/>
+          </a:xfrm>
+          <a:prstGeom prst="rect">
+            <a:avLst/>
+          </a:prstGeom>
+        </p:spPr>
+      </p:pic>
     </p:spTree>
-    <p:extLst>
-      <p:ext uri="{BB962C8B-B14F-4D97-AF65-F5344CB8AC3E}">
-        <p14:creationId xmlns:p14="http://schemas.microsoft.com/office/powerpoint/2010/main" val="1108247251"/>
-      </p:ext>
-    </p:extLst>
   </p:cSld>
   <p:clrMapOvr>
     <a:masterClrMapping/>
@@ -8989,7 +9031,15 @@
           <a:p>
             <a:r>
               <a:rPr lang="en-US" dirty="0"/>
-              <a:t>Background</a:t>
+              <a:t>Meet </a:t>
+            </a:r>
+            <a:r>
+              <a:rPr lang="en-US" dirty="0" err="1"/>
+              <a:t>FrankenBeer</a:t>
+            </a:r>
+            <a:r>
+              <a:rPr lang="en-US" dirty="0"/>
+              <a:t>!</a:t>
             </a:r>
           </a:p>
         </p:txBody>
@@ -9006,58 +9056,67 @@
         </p:nvSpPr>
         <p:spPr>
           <a:xfrm>
-            <a:off x="123190" y="2188210"/>
-            <a:ext cx="6821805" cy="4507865"/>
-          </a:xfrm>
-        </p:spPr>
-        <p:txBody>
-          <a:bodyPr/>
+            <a:off x="297767" y="2510653"/>
+            <a:ext cx="6422844" cy="3599316"/>
+          </a:xfrm>
+        </p:spPr>
+        <p:txBody>
+          <a:bodyPr>
+            <a:normAutofit fontScale="92500" lnSpcReduction="10000"/>
+          </a:bodyPr>
           <a:lstStyle/>
           <a:p>
             <a:r>
-              <a:rPr lang="en-US" sz="2000" dirty="0">
-                <a:sym typeface="+mn-ea"/>
-              </a:rPr>
-              <a:t>There are more than 1200 beers in the 50 states (plus District of Columbia) of various ABV and IBU levels. Microbrewery presence varies as well from state to state. </a:t>
-            </a:r>
-          </a:p>
-          <a:p>
-            <a:endParaRPr lang="en-US" sz="2000"/>
-          </a:p>
-          <a:p>
-            <a:r>
-              <a:rPr lang="en-US" sz="2000"/>
-              <a:t>Our FrankenBeer has seen increasing sales since the initial roll out 2 years ago. FrankenBeer</a:t>
-            </a:r>
-            <a:r>
-              <a:rPr lang="en-US" sz="2000">
-                <a:sym typeface="+mn-ea"/>
-              </a:rPr>
-              <a:t> has garnered much acclaim in Seattle, Washington and Boulder, Colorado. From the feedback, there there is no other beer like it. </a:t>
-            </a:r>
-          </a:p>
-          <a:p>
-            <a:endParaRPr lang="en-US" sz="2000">
-              <a:sym typeface="+mn-ea"/>
-            </a:endParaRPr>
-          </a:p>
-          <a:p>
-            <a:r>
-              <a:rPr lang="en-US" sz="2000">
-                <a:sym typeface="+mn-ea"/>
-              </a:rPr>
-              <a:t>Many other established chains have requested we allow the beer to be produced and sold closer to their markets. </a:t>
-            </a:r>
-            <a:endParaRPr lang="en-US" sz="2000"/>
-          </a:p>
-          <a:p>
-            <a:endParaRPr lang="en-US" sz="2000"/>
+              <a:rPr lang="en-US" dirty="0" err="1"/>
+              <a:t>FrankenBeer</a:t>
+            </a:r>
+            <a:r>
+              <a:rPr lang="en-US" dirty="0"/>
+              <a:t> was created to address a perceived ‘untapped’ demand for the crisp taste of high alcohol content beer without the bitterness which accompanies existing product offerings in this segment. </a:t>
+            </a:r>
+          </a:p>
+          <a:p>
+            <a:r>
+              <a:rPr lang="en-US" dirty="0"/>
+              <a:t>Our beer scientists have created a novel brewing technique enabling us to deliver 12% ABV at only 33 IBU’s  </a:t>
+            </a:r>
+          </a:p>
+          <a:p>
+            <a:r>
+              <a:rPr lang="en-US" dirty="0"/>
+              <a:t>The </a:t>
+            </a:r>
+            <a:r>
+              <a:rPr lang="en-US" dirty="0" err="1"/>
+              <a:t>ABRAcadabra</a:t>
+            </a:r>
+            <a:r>
+              <a:rPr lang="en-US" baseline="30000" dirty="0" err="1"/>
+              <a:t>TM</a:t>
+            </a:r>
+            <a:r>
+              <a:rPr lang="en-US" baseline="30000" dirty="0"/>
+              <a:t> </a:t>
+            </a:r>
+            <a:r>
+              <a:rPr lang="en-US" dirty="0"/>
+              <a:t> process (Alcohol Bitterness Reduction &amp; Abatement) has performed well within our dedicated team of full time tasters and in initial test markets </a:t>
+            </a:r>
+          </a:p>
+          <a:p>
+            <a:endParaRPr lang="en-US" dirty="0"/>
           </a:p>
         </p:txBody>
       </p:sp>
       <p:pic>
         <p:nvPicPr>
-          <p:cNvPr id="5" name="Content Placeholder 3"/>
+          <p:cNvPr id="5" name="Picture 4">
+            <a:extLst>
+              <a:ext uri="{FF2B5EF4-FFF2-40B4-BE49-F238E27FC236}">
+                <a16:creationId xmlns:a16="http://schemas.microsoft.com/office/drawing/2014/main" id="{0C2158C5-EA90-0444-ACE2-C856EBB1F4EE}"/>
+              </a:ext>
+            </a:extLst>
+          </p:cNvPr>
           <p:cNvPicPr>
             <a:picLocks noChangeAspect="1"/>
           </p:cNvPicPr>
@@ -9071,8 +9130,8 @@
         </p:blipFill>
         <p:spPr>
           <a:xfrm>
-            <a:off x="7138035" y="2597150"/>
-            <a:ext cx="4900295" cy="3500120"/>
+            <a:off x="6920397" y="2677128"/>
+            <a:ext cx="5072822" cy="3432841"/>
           </a:xfrm>
           <a:prstGeom prst="rect">
             <a:avLst/>
@@ -9080,6 +9139,11 @@
         </p:spPr>
       </p:pic>
     </p:spTree>
+    <p:extLst>
+      <p:ext uri="{BB962C8B-B14F-4D97-AF65-F5344CB8AC3E}">
+        <p14:creationId xmlns:p14="http://schemas.microsoft.com/office/powerpoint/2010/main" val="1108247251"/>
+      </p:ext>
+    </p:extLst>
   </p:cSld>
   <p:clrMapOvr>
     <a:masterClrMapping/>
@@ -9121,7 +9185,7 @@
           <a:p>
             <a:r>
               <a:rPr lang="en-US" dirty="0"/>
-              <a:t>Problem Statement</a:t>
+              <a:t>Where do we go from here? </a:t>
             </a:r>
           </a:p>
         </p:txBody>

</xml_diff>

<commit_message>
removed all edits except FrankenBeer slide.
</commit_message>
<xml_diff>
--- a/Case Study - Project 1 - Final.pptx
+++ b/Case Study - Project 1 - Final.pptx
@@ -4,16 +4,13 @@
   <p:sldMasterIdLst>
     <p:sldMasterId id="2147483648" r:id="rId1"/>
   </p:sldMasterIdLst>
-  <p:notesMasterIdLst>
-    <p:notesMasterId r:id="rId12"/>
-  </p:notesMasterIdLst>
   <p:sldIdLst>
     <p:sldId id="256" r:id="rId2"/>
     <p:sldId id="266" r:id="rId3"/>
     <p:sldId id="257" r:id="rId4"/>
     <p:sldId id="259" r:id="rId5"/>
-    <p:sldId id="279" r:id="rId6"/>
-    <p:sldId id="258" r:id="rId7"/>
+    <p:sldId id="258" r:id="rId6"/>
+    <p:sldId id="279" r:id="rId7"/>
     <p:sldId id="262" r:id="rId8"/>
     <p:sldId id="263" r:id="rId9"/>
     <p:sldId id="278" r:id="rId10"/>
@@ -122,523 +119,6 @@
     </p:ext>
   </p:extLst>
 </p:presentation>
-</file>
-
-<file path=ppt/notesMasters/notesMaster1.xml><?xml version="1.0" encoding="utf-8"?>
-<p:notesMaster xmlns:a="http://schemas.openxmlformats.org/drawingml/2006/main" xmlns:r="http://schemas.openxmlformats.org/officeDocument/2006/relationships" xmlns:p="http://schemas.openxmlformats.org/presentationml/2006/main">
-  <p:cSld>
-    <p:bg>
-      <p:bgRef idx="1001">
-        <a:schemeClr val="bg1"/>
-      </p:bgRef>
-    </p:bg>
-    <p:spTree>
-      <p:nvGrpSpPr>
-        <p:cNvPr id="1" name=""/>
-        <p:cNvGrpSpPr/>
-        <p:nvPr/>
-      </p:nvGrpSpPr>
-      <p:grpSpPr>
-        <a:xfrm>
-          <a:off x="0" y="0"/>
-          <a:ext cx="0" cy="0"/>
-          <a:chOff x="0" y="0"/>
-          <a:chExt cx="0" cy="0"/>
-        </a:xfrm>
-      </p:grpSpPr>
-      <p:sp>
-        <p:nvSpPr>
-          <p:cNvPr id="2" name="Header Placeholder 1"/>
-          <p:cNvSpPr>
-            <a:spLocks noGrp="1"/>
-          </p:cNvSpPr>
-          <p:nvPr>
-            <p:ph type="hdr" sz="quarter"/>
-          </p:nvPr>
-        </p:nvSpPr>
-        <p:spPr>
-          <a:xfrm>
-            <a:off x="0" y="0"/>
-            <a:ext cx="2971800" cy="458788"/>
-          </a:xfrm>
-          <a:prstGeom prst="rect">
-            <a:avLst/>
-          </a:prstGeom>
-        </p:spPr>
-        <p:txBody>
-          <a:bodyPr vert="horz" lIns="91440" tIns="45720" rIns="91440" bIns="45720" rtlCol="0"/>
-          <a:lstStyle>
-            <a:lvl1pPr algn="l">
-              <a:defRPr sz="1200"/>
-            </a:lvl1pPr>
-          </a:lstStyle>
-          <a:p>
-            <a:endParaRPr lang="en-US"/>
-          </a:p>
-        </p:txBody>
-      </p:sp>
-      <p:sp>
-        <p:nvSpPr>
-          <p:cNvPr id="3" name="Date Placeholder 2"/>
-          <p:cNvSpPr>
-            <a:spLocks noGrp="1"/>
-          </p:cNvSpPr>
-          <p:nvPr>
-            <p:ph type="dt" idx="1"/>
-          </p:nvPr>
-        </p:nvSpPr>
-        <p:spPr>
-          <a:xfrm>
-            <a:off x="3884613" y="0"/>
-            <a:ext cx="2971800" cy="458788"/>
-          </a:xfrm>
-          <a:prstGeom prst="rect">
-            <a:avLst/>
-          </a:prstGeom>
-        </p:spPr>
-        <p:txBody>
-          <a:bodyPr vert="horz" lIns="91440" tIns="45720" rIns="91440" bIns="45720" rtlCol="0"/>
-          <a:lstStyle>
-            <a:lvl1pPr algn="r">
-              <a:defRPr sz="1200"/>
-            </a:lvl1pPr>
-          </a:lstStyle>
-          <a:p>
-            <a:fld id="{4586B1FD-F6BF-C140-9DD4-6741C72BEFCA}" type="datetimeFigureOut">
-              <a:rPr lang="en-US" smtClean="0"/>
-              <a:t>6/25/18</a:t>
-            </a:fld>
-            <a:endParaRPr lang="en-US"/>
-          </a:p>
-        </p:txBody>
-      </p:sp>
-      <p:sp>
-        <p:nvSpPr>
-          <p:cNvPr id="4" name="Slide Image Placeholder 3"/>
-          <p:cNvSpPr>
-            <a:spLocks noGrp="1" noRot="1" noChangeAspect="1"/>
-          </p:cNvSpPr>
-          <p:nvPr>
-            <p:ph type="sldImg" idx="2"/>
-          </p:nvPr>
-        </p:nvSpPr>
-        <p:spPr>
-          <a:xfrm>
-            <a:off x="685800" y="1143000"/>
-            <a:ext cx="5486400" cy="3086100"/>
-          </a:xfrm>
-          <a:prstGeom prst="rect">
-            <a:avLst/>
-          </a:prstGeom>
-          <a:noFill/>
-          <a:ln w="12700">
-            <a:solidFill>
-              <a:prstClr val="black"/>
-            </a:solidFill>
-          </a:ln>
-        </p:spPr>
-        <p:txBody>
-          <a:bodyPr vert="horz" lIns="91440" tIns="45720" rIns="91440" bIns="45720" rtlCol="0" anchor="ctr"/>
-          <a:lstStyle/>
-          <a:p>
-            <a:endParaRPr lang="en-US"/>
-          </a:p>
-        </p:txBody>
-      </p:sp>
-      <p:sp>
-        <p:nvSpPr>
-          <p:cNvPr id="5" name="Notes Placeholder 4"/>
-          <p:cNvSpPr>
-            <a:spLocks noGrp="1"/>
-          </p:cNvSpPr>
-          <p:nvPr>
-            <p:ph type="body" sz="quarter" idx="3"/>
-          </p:nvPr>
-        </p:nvSpPr>
-        <p:spPr>
-          <a:xfrm>
-            <a:off x="685800" y="4400550"/>
-            <a:ext cx="5486400" cy="3600450"/>
-          </a:xfrm>
-          <a:prstGeom prst="rect">
-            <a:avLst/>
-          </a:prstGeom>
-        </p:spPr>
-        <p:txBody>
-          <a:bodyPr vert="horz" lIns="91440" tIns="45720" rIns="91440" bIns="45720" rtlCol="0"/>
-          <a:lstStyle/>
-          <a:p>
-            <a:pPr lvl="0"/>
-            <a:r>
-              <a:rPr lang="en-US"/>
-              <a:t>Edit Master text styles</a:t>
-            </a:r>
-          </a:p>
-          <a:p>
-            <a:pPr lvl="1"/>
-            <a:r>
-              <a:rPr lang="en-US"/>
-              <a:t>Second level</a:t>
-            </a:r>
-          </a:p>
-          <a:p>
-            <a:pPr lvl="2"/>
-            <a:r>
-              <a:rPr lang="en-US"/>
-              <a:t>Third level</a:t>
-            </a:r>
-          </a:p>
-          <a:p>
-            <a:pPr lvl="3"/>
-            <a:r>
-              <a:rPr lang="en-US"/>
-              <a:t>Fourth level</a:t>
-            </a:r>
-          </a:p>
-          <a:p>
-            <a:pPr lvl="4"/>
-            <a:r>
-              <a:rPr lang="en-US"/>
-              <a:t>Fifth level</a:t>
-            </a:r>
-          </a:p>
-        </p:txBody>
-      </p:sp>
-      <p:sp>
-        <p:nvSpPr>
-          <p:cNvPr id="6" name="Footer Placeholder 5"/>
-          <p:cNvSpPr>
-            <a:spLocks noGrp="1"/>
-          </p:cNvSpPr>
-          <p:nvPr>
-            <p:ph type="ftr" sz="quarter" idx="4"/>
-          </p:nvPr>
-        </p:nvSpPr>
-        <p:spPr>
-          <a:xfrm>
-            <a:off x="0" y="8685213"/>
-            <a:ext cx="2971800" cy="458787"/>
-          </a:xfrm>
-          <a:prstGeom prst="rect">
-            <a:avLst/>
-          </a:prstGeom>
-        </p:spPr>
-        <p:txBody>
-          <a:bodyPr vert="horz" lIns="91440" tIns="45720" rIns="91440" bIns="45720" rtlCol="0" anchor="b"/>
-          <a:lstStyle>
-            <a:lvl1pPr algn="l">
-              <a:defRPr sz="1200"/>
-            </a:lvl1pPr>
-          </a:lstStyle>
-          <a:p>
-            <a:endParaRPr lang="en-US"/>
-          </a:p>
-        </p:txBody>
-      </p:sp>
-      <p:sp>
-        <p:nvSpPr>
-          <p:cNvPr id="7" name="Slide Number Placeholder 6"/>
-          <p:cNvSpPr>
-            <a:spLocks noGrp="1"/>
-          </p:cNvSpPr>
-          <p:nvPr>
-            <p:ph type="sldNum" sz="quarter" idx="5"/>
-          </p:nvPr>
-        </p:nvSpPr>
-        <p:spPr>
-          <a:xfrm>
-            <a:off x="3884613" y="8685213"/>
-            <a:ext cx="2971800" cy="458787"/>
-          </a:xfrm>
-          <a:prstGeom prst="rect">
-            <a:avLst/>
-          </a:prstGeom>
-        </p:spPr>
-        <p:txBody>
-          <a:bodyPr vert="horz" lIns="91440" tIns="45720" rIns="91440" bIns="45720" rtlCol="0" anchor="b"/>
-          <a:lstStyle>
-            <a:lvl1pPr algn="r">
-              <a:defRPr sz="1200"/>
-            </a:lvl1pPr>
-          </a:lstStyle>
-          <a:p>
-            <a:fld id="{13A72274-11AC-8C41-AE0A-D20F8A90A56D}" type="slidenum">
-              <a:rPr lang="en-US" smtClean="0"/>
-              <a:t>‹#›</a:t>
-            </a:fld>
-            <a:endParaRPr lang="en-US"/>
-          </a:p>
-        </p:txBody>
-      </p:sp>
-    </p:spTree>
-    <p:extLst>
-      <p:ext uri="{BB962C8B-B14F-4D97-AF65-F5344CB8AC3E}">
-        <p14:creationId xmlns:p14="http://schemas.microsoft.com/office/powerpoint/2010/main" val="2154822351"/>
-      </p:ext>
-    </p:extLst>
-  </p:cSld>
-  <p:clrMap bg1="lt1" tx1="dk1" bg2="lt2" tx2="dk2" accent1="accent1" accent2="accent2" accent3="accent3" accent4="accent4" accent5="accent5" accent6="accent6" hlink="hlink" folHlink="folHlink"/>
-  <p:notesStyle>
-    <a:lvl1pPr marL="0" algn="l" defTabSz="914400" rtl="0" eaLnBrk="1" latinLnBrk="0" hangingPunct="1">
-      <a:defRPr sz="1200" kern="1200">
-        <a:solidFill>
-          <a:schemeClr val="tx1"/>
-        </a:solidFill>
-        <a:latin typeface="+mn-lt"/>
-        <a:ea typeface="+mn-ea"/>
-        <a:cs typeface="+mn-cs"/>
-      </a:defRPr>
-    </a:lvl1pPr>
-    <a:lvl2pPr marL="457200" algn="l" defTabSz="914400" rtl="0" eaLnBrk="1" latinLnBrk="0" hangingPunct="1">
-      <a:defRPr sz="1200" kern="1200">
-        <a:solidFill>
-          <a:schemeClr val="tx1"/>
-        </a:solidFill>
-        <a:latin typeface="+mn-lt"/>
-        <a:ea typeface="+mn-ea"/>
-        <a:cs typeface="+mn-cs"/>
-      </a:defRPr>
-    </a:lvl2pPr>
-    <a:lvl3pPr marL="914400" algn="l" defTabSz="914400" rtl="0" eaLnBrk="1" latinLnBrk="0" hangingPunct="1">
-      <a:defRPr sz="1200" kern="1200">
-        <a:solidFill>
-          <a:schemeClr val="tx1"/>
-        </a:solidFill>
-        <a:latin typeface="+mn-lt"/>
-        <a:ea typeface="+mn-ea"/>
-        <a:cs typeface="+mn-cs"/>
-      </a:defRPr>
-    </a:lvl3pPr>
-    <a:lvl4pPr marL="1371600" algn="l" defTabSz="914400" rtl="0" eaLnBrk="1" latinLnBrk="0" hangingPunct="1">
-      <a:defRPr sz="1200" kern="1200">
-        <a:solidFill>
-          <a:schemeClr val="tx1"/>
-        </a:solidFill>
-        <a:latin typeface="+mn-lt"/>
-        <a:ea typeface="+mn-ea"/>
-        <a:cs typeface="+mn-cs"/>
-      </a:defRPr>
-    </a:lvl4pPr>
-    <a:lvl5pPr marL="1828800" algn="l" defTabSz="914400" rtl="0" eaLnBrk="1" latinLnBrk="0" hangingPunct="1">
-      <a:defRPr sz="1200" kern="1200">
-        <a:solidFill>
-          <a:schemeClr val="tx1"/>
-        </a:solidFill>
-        <a:latin typeface="+mn-lt"/>
-        <a:ea typeface="+mn-ea"/>
-        <a:cs typeface="+mn-cs"/>
-      </a:defRPr>
-    </a:lvl5pPr>
-    <a:lvl6pPr marL="2286000" algn="l" defTabSz="914400" rtl="0" eaLnBrk="1" latinLnBrk="0" hangingPunct="1">
-      <a:defRPr sz="1200" kern="1200">
-        <a:solidFill>
-          <a:schemeClr val="tx1"/>
-        </a:solidFill>
-        <a:latin typeface="+mn-lt"/>
-        <a:ea typeface="+mn-ea"/>
-        <a:cs typeface="+mn-cs"/>
-      </a:defRPr>
-    </a:lvl6pPr>
-    <a:lvl7pPr marL="2743200" algn="l" defTabSz="914400" rtl="0" eaLnBrk="1" latinLnBrk="0" hangingPunct="1">
-      <a:defRPr sz="1200" kern="1200">
-        <a:solidFill>
-          <a:schemeClr val="tx1"/>
-        </a:solidFill>
-        <a:latin typeface="+mn-lt"/>
-        <a:ea typeface="+mn-ea"/>
-        <a:cs typeface="+mn-cs"/>
-      </a:defRPr>
-    </a:lvl7pPr>
-    <a:lvl8pPr marL="3200400" algn="l" defTabSz="914400" rtl="0" eaLnBrk="1" latinLnBrk="0" hangingPunct="1">
-      <a:defRPr sz="1200" kern="1200">
-        <a:solidFill>
-          <a:schemeClr val="tx1"/>
-        </a:solidFill>
-        <a:latin typeface="+mn-lt"/>
-        <a:ea typeface="+mn-ea"/>
-        <a:cs typeface="+mn-cs"/>
-      </a:defRPr>
-    </a:lvl8pPr>
-    <a:lvl9pPr marL="3657600" algn="l" defTabSz="914400" rtl="0" eaLnBrk="1" latinLnBrk="0" hangingPunct="1">
-      <a:defRPr sz="1200" kern="1200">
-        <a:solidFill>
-          <a:schemeClr val="tx1"/>
-        </a:solidFill>
-        <a:latin typeface="+mn-lt"/>
-        <a:ea typeface="+mn-ea"/>
-        <a:cs typeface="+mn-cs"/>
-      </a:defRPr>
-    </a:lvl9pPr>
-  </p:notesStyle>
-</p:notesMaster>
-</file>
-
-<file path=ppt/notesSlides/notesSlide1.xml><?xml version="1.0" encoding="utf-8"?>
-<p:notes xmlns:a="http://schemas.openxmlformats.org/drawingml/2006/main" xmlns:r="http://schemas.openxmlformats.org/officeDocument/2006/relationships" xmlns:p="http://schemas.openxmlformats.org/presentationml/2006/main">
-  <p:cSld>
-    <p:spTree>
-      <p:nvGrpSpPr>
-        <p:cNvPr id="1" name=""/>
-        <p:cNvGrpSpPr/>
-        <p:nvPr/>
-      </p:nvGrpSpPr>
-      <p:grpSpPr>
-        <a:xfrm>
-          <a:off x="0" y="0"/>
-          <a:ext cx="0" cy="0"/>
-          <a:chOff x="0" y="0"/>
-          <a:chExt cx="0" cy="0"/>
-        </a:xfrm>
-      </p:grpSpPr>
-      <p:sp>
-        <p:nvSpPr>
-          <p:cNvPr id="2" name="Slide Image Placeholder 1"/>
-          <p:cNvSpPr>
-            <a:spLocks noGrp="1" noRot="1" noChangeAspect="1"/>
-          </p:cNvSpPr>
-          <p:nvPr>
-            <p:ph type="sldImg"/>
-          </p:nvPr>
-        </p:nvSpPr>
-        <p:spPr/>
-      </p:sp>
-      <p:sp>
-        <p:nvSpPr>
-          <p:cNvPr id="3" name="Notes Placeholder 2"/>
-          <p:cNvSpPr>
-            <a:spLocks noGrp="1"/>
-          </p:cNvSpPr>
-          <p:nvPr>
-            <p:ph type="body" idx="1"/>
-          </p:nvPr>
-        </p:nvSpPr>
-        <p:spPr/>
-        <p:txBody>
-          <a:bodyPr/>
-          <a:lstStyle/>
-          <a:p>
-            <a:endParaRPr lang="en-US"/>
-          </a:p>
-        </p:txBody>
-      </p:sp>
-      <p:sp>
-        <p:nvSpPr>
-          <p:cNvPr id="4" name="Slide Number Placeholder 3"/>
-          <p:cNvSpPr>
-            <a:spLocks noGrp="1"/>
-          </p:cNvSpPr>
-          <p:nvPr>
-            <p:ph type="sldNum" sz="quarter" idx="10"/>
-          </p:nvPr>
-        </p:nvSpPr>
-        <p:spPr/>
-        <p:txBody>
-          <a:bodyPr/>
-          <a:lstStyle/>
-          <a:p>
-            <a:fld id="{13A72274-11AC-8C41-AE0A-D20F8A90A56D}" type="slidenum">
-              <a:rPr lang="en-US" smtClean="0"/>
-              <a:t>1</a:t>
-            </a:fld>
-            <a:endParaRPr lang="en-US"/>
-          </a:p>
-        </p:txBody>
-      </p:sp>
-    </p:spTree>
-    <p:extLst>
-      <p:ext uri="{BB962C8B-B14F-4D97-AF65-F5344CB8AC3E}">
-        <p14:creationId xmlns:p14="http://schemas.microsoft.com/office/powerpoint/2010/main" val="454911935"/>
-      </p:ext>
-    </p:extLst>
-  </p:cSld>
-  <p:clrMapOvr>
-    <a:masterClrMapping/>
-  </p:clrMapOvr>
-</p:notes>
-</file>
-
-<file path=ppt/notesSlides/notesSlide2.xml><?xml version="1.0" encoding="utf-8"?>
-<p:notes xmlns:a="http://schemas.openxmlformats.org/drawingml/2006/main" xmlns:r="http://schemas.openxmlformats.org/officeDocument/2006/relationships" xmlns:p="http://schemas.openxmlformats.org/presentationml/2006/main">
-  <p:cSld>
-    <p:spTree>
-      <p:nvGrpSpPr>
-        <p:cNvPr id="1" name=""/>
-        <p:cNvGrpSpPr/>
-        <p:nvPr/>
-      </p:nvGrpSpPr>
-      <p:grpSpPr>
-        <a:xfrm>
-          <a:off x="0" y="0"/>
-          <a:ext cx="0" cy="0"/>
-          <a:chOff x="0" y="0"/>
-          <a:chExt cx="0" cy="0"/>
-        </a:xfrm>
-      </p:grpSpPr>
-      <p:sp>
-        <p:nvSpPr>
-          <p:cNvPr id="2" name="Slide Image Placeholder 1"/>
-          <p:cNvSpPr>
-            <a:spLocks noGrp="1" noRot="1" noChangeAspect="1"/>
-          </p:cNvSpPr>
-          <p:nvPr>
-            <p:ph type="sldImg"/>
-          </p:nvPr>
-        </p:nvSpPr>
-        <p:spPr/>
-      </p:sp>
-      <p:sp>
-        <p:nvSpPr>
-          <p:cNvPr id="3" name="Notes Placeholder 2"/>
-          <p:cNvSpPr>
-            <a:spLocks noGrp="1"/>
-          </p:cNvSpPr>
-          <p:nvPr>
-            <p:ph type="body" idx="1"/>
-          </p:nvPr>
-        </p:nvSpPr>
-        <p:spPr/>
-        <p:txBody>
-          <a:bodyPr/>
-          <a:lstStyle/>
-          <a:p>
-            <a:endParaRPr lang="en-US"/>
-          </a:p>
-        </p:txBody>
-      </p:sp>
-      <p:sp>
-        <p:nvSpPr>
-          <p:cNvPr id="4" name="Slide Number Placeholder 3"/>
-          <p:cNvSpPr>
-            <a:spLocks noGrp="1"/>
-          </p:cNvSpPr>
-          <p:nvPr>
-            <p:ph type="sldNum" sz="quarter" idx="10"/>
-          </p:nvPr>
-        </p:nvSpPr>
-        <p:spPr/>
-        <p:txBody>
-          <a:bodyPr/>
-          <a:lstStyle/>
-          <a:p>
-            <a:fld id="{13A72274-11AC-8C41-AE0A-D20F8A90A56D}" type="slidenum">
-              <a:rPr lang="en-US" smtClean="0"/>
-              <a:t>2</a:t>
-            </a:fld>
-            <a:endParaRPr lang="en-US"/>
-          </a:p>
-        </p:txBody>
-      </p:sp>
-    </p:spTree>
-    <p:extLst>
-      <p:ext uri="{BB962C8B-B14F-4D97-AF65-F5344CB8AC3E}">
-        <p14:creationId xmlns:p14="http://schemas.microsoft.com/office/powerpoint/2010/main" val="619637756"/>
-      </p:ext>
-    </p:extLst>
-  </p:cSld>
-  <p:clrMapOvr>
-    <a:masterClrMapping/>
-  </p:clrMapOvr>
-</p:notes>
 </file>
 
 <file path=ppt/slideLayouts/slideLayout1.xml><?xml version="1.0" encoding="utf-8"?>
@@ -8203,7 +7683,7 @@
           <a:bodyPr/>
           <a:lstStyle/>
           <a:p>
-            <a:endParaRPr lang="en-US" dirty="0"/>
+            <a:endParaRPr lang="en-US"/>
           </a:p>
         </p:txBody>
       </p:sp>
@@ -8235,14 +7715,14 @@
           <p:nvPr/>
         </p:nvPicPr>
         <p:blipFill>
-          <a:blip r:embed="rId3"/>
+          <a:blip r:embed="rId2"/>
           <a:stretch>
             <a:fillRect/>
           </a:stretch>
         </p:blipFill>
         <p:spPr>
           <a:xfrm>
-            <a:off x="0" y="195580"/>
+            <a:off x="635" y="-25400"/>
             <a:ext cx="12190730" cy="6864350"/>
           </a:xfrm>
           <a:prstGeom prst="rect">
@@ -8600,9 +8080,7 @@
           </a:xfrm>
         </p:spPr>
         <p:txBody>
-          <a:bodyPr>
-            <a:normAutofit/>
-          </a:bodyPr>
+          <a:bodyPr/>
           <a:lstStyle/>
           <a:p>
             <a:r>
@@ -8613,25 +8091,21 @@
           <a:p>
             <a:r>
               <a:rPr lang="en-US" dirty="0"/>
-              <a:t>Market Backdrop</a:t>
+              <a:t>Background</a:t>
             </a:r>
           </a:p>
           <a:p>
             <a:r>
               <a:rPr lang="en-US" dirty="0"/>
-              <a:t>Meet </a:t>
-            </a:r>
+              <a:t>Problem Statement</a:t>
+            </a:r>
+          </a:p>
+          <a:p>
             <a:r>
               <a:rPr lang="en-US" dirty="0" err="1"/>
               <a:t>FrankenBeer</a:t>
             </a:r>
             <a:endParaRPr lang="en-US" dirty="0"/>
-          </a:p>
-          <a:p>
-            <a:r>
-              <a:rPr lang="en-US" dirty="0"/>
-              <a:t>Where do we go from here? </a:t>
-            </a:r>
           </a:p>
           <a:p>
             <a:r>
@@ -8734,13 +8208,6 @@
             <a:pPr lvl="1"/>
             <a:r>
               <a:rPr lang="en-US" dirty="0"/>
-              <a:t>Nick Cellini</a:t>
-            </a:r>
-          </a:p>
-          <a:p>
-            <a:pPr lvl="1"/>
-            <a:r>
-              <a:rPr lang="en-US" dirty="0"/>
               <a:t>Chris Graves</a:t>
             </a:r>
           </a:p>
@@ -8749,6 +8216,13 @@
             <a:r>
               <a:rPr lang="en-US" dirty="0"/>
               <a:t>Heber Nielsen</a:t>
+            </a:r>
+          </a:p>
+          <a:p>
+            <a:pPr lvl="1"/>
+            <a:r>
+              <a:rPr lang="en-US" dirty="0"/>
+              <a:t>Nick Cellini</a:t>
             </a:r>
           </a:p>
           <a:p>
@@ -8844,7 +8318,7 @@
           <a:p>
             <a:r>
               <a:rPr lang="en-US" dirty="0"/>
-              <a:t>Market Backdrop</a:t>
+              <a:t>Background</a:t>
             </a:r>
           </a:p>
         </p:txBody>
@@ -8866,42 +8340,47 @@
           </a:xfrm>
         </p:spPr>
         <p:txBody>
-          <a:bodyPr>
-            <a:normAutofit/>
-          </a:bodyPr>
+          <a:bodyPr/>
           <a:lstStyle/>
           <a:p>
             <a:r>
               <a:rPr lang="en-US" sz="2000" dirty="0">
                 <a:sym typeface="+mn-ea"/>
               </a:rPr>
-              <a:t>The crowded Microbrew landscape continues to expand with 558 Breweries offering a proliferating selection of 2,410 beers across the domestic US market</a:t>
-            </a:r>
-          </a:p>
-          <a:p>
-            <a:endParaRPr lang="en-US" sz="2000" dirty="0"/>
-          </a:p>
-          <a:p>
-            <a:r>
-              <a:rPr lang="en-US" sz="2000" dirty="0">
+              <a:t>There are more than 1200 beers in the 50 states (plus District of Columbia) of various ABV and IBU levels. Microbrewery presence varies as well from state to state. </a:t>
+            </a:r>
+          </a:p>
+          <a:p>
+            <a:endParaRPr lang="en-US" sz="2000"/>
+          </a:p>
+          <a:p>
+            <a:r>
+              <a:rPr lang="en-US" sz="2000"/>
+              <a:t>Our FrankenBeer has seen increasing sales since the initial roll out 2 years ago. FrankenBeer</a:t>
+            </a:r>
+            <a:r>
+              <a:rPr lang="en-US" sz="2000">
                 <a:sym typeface="+mn-ea"/>
               </a:rPr>
-              <a:t>The distribution of Breweries by state is highly variable with concentrations in Colorado, California, and Michigan - homes of “old guard” national brands and brews</a:t>
-            </a:r>
-          </a:p>
-          <a:p>
-            <a:endParaRPr lang="en-US" sz="2000" dirty="0">
+              <a:t> has garnered much acclaim in Seattle, Washington and Boulder, Colorado. From the feedback, there there is no other beer like it. </a:t>
+            </a:r>
+          </a:p>
+          <a:p>
+            <a:endParaRPr lang="en-US" sz="2000">
               <a:sym typeface="+mn-ea"/>
             </a:endParaRPr>
           </a:p>
           <a:p>
             <a:r>
-              <a:rPr lang="en-US" sz="2000" dirty="0">
+              <a:rPr lang="en-US" sz="2000">
                 <a:sym typeface="+mn-ea"/>
               </a:rPr>
-              <a:t>While median alcohol content (ABV) is solidly clustered in the 5% to 6% range across markets, bitterness (IBU) is much more variable</a:t>
-            </a:r>
-            <a:endParaRPr lang="en-US" sz="2000" dirty="0"/>
+              <a:t>Many other established chains have requested we allow the beer to be produced and sold closer to their markets. </a:t>
+            </a:r>
+            <a:endParaRPr lang="en-US" sz="2000"/>
+          </a:p>
+          <a:p>
+            <a:endParaRPr lang="en-US" sz="2000"/>
           </a:p>
         </p:txBody>
       </p:sp>
@@ -8921,68 +8400,8 @@
         </p:blipFill>
         <p:spPr>
           <a:xfrm>
-            <a:off x="6993541" y="2076886"/>
-            <a:ext cx="2742384" cy="1958795"/>
-          </a:xfrm>
-          <a:prstGeom prst="rect">
-            <a:avLst/>
-          </a:prstGeom>
-        </p:spPr>
-      </p:pic>
-      <p:pic>
-        <p:nvPicPr>
-          <p:cNvPr id="6" name="Picture 5">
-            <a:extLst>
-              <a:ext uri="{FF2B5EF4-FFF2-40B4-BE49-F238E27FC236}">
-                <a16:creationId xmlns:a16="http://schemas.microsoft.com/office/drawing/2014/main" id="{A886447B-E543-5649-8613-F354C16EF1BD}"/>
-              </a:ext>
-            </a:extLst>
-          </p:cNvPr>
-          <p:cNvPicPr>
-            <a:picLocks noChangeAspect="1"/>
-          </p:cNvPicPr>
-          <p:nvPr/>
-        </p:nvPicPr>
-        <p:blipFill>
-          <a:blip r:embed="rId3"/>
-          <a:stretch>
-            <a:fillRect/>
-          </a:stretch>
-        </p:blipFill>
-        <p:spPr>
-          <a:xfrm>
-            <a:off x="9498929" y="3621240"/>
-            <a:ext cx="2643740" cy="1910015"/>
-          </a:xfrm>
-          <a:prstGeom prst="rect">
-            <a:avLst/>
-          </a:prstGeom>
-        </p:spPr>
-      </p:pic>
-      <p:pic>
-        <p:nvPicPr>
-          <p:cNvPr id="8" name="Picture 7">
-            <a:extLst>
-              <a:ext uri="{FF2B5EF4-FFF2-40B4-BE49-F238E27FC236}">
-                <a16:creationId xmlns:a16="http://schemas.microsoft.com/office/drawing/2014/main" id="{069C4DF6-A4B0-404A-ABA4-A9CC7F8306E4}"/>
-              </a:ext>
-            </a:extLst>
-          </p:cNvPr>
-          <p:cNvPicPr>
-            <a:picLocks noChangeAspect="1"/>
-          </p:cNvPicPr>
-          <p:nvPr/>
-        </p:nvPicPr>
-        <p:blipFill>
-          <a:blip r:embed="rId4"/>
-          <a:stretch>
-            <a:fillRect/>
-          </a:stretch>
-        </p:blipFill>
-        <p:spPr>
-          <a:xfrm>
-            <a:off x="6993541" y="4804603"/>
-            <a:ext cx="2611055" cy="1891472"/>
+            <a:off x="7138035" y="2597150"/>
+            <a:ext cx="4900295" cy="3500120"/>
           </a:xfrm>
           <a:prstGeom prst="rect">
             <a:avLst/>
@@ -9031,15 +8450,7 @@
           <a:p>
             <a:r>
               <a:rPr lang="en-US" dirty="0"/>
-              <a:t>Meet </a:t>
-            </a:r>
-            <a:r>
-              <a:rPr lang="en-US" dirty="0" err="1"/>
-              <a:t>FrankenBeer</a:t>
-            </a:r>
-            <a:r>
-              <a:rPr lang="en-US" dirty="0"/>
-              <a:t>!</a:t>
+              <a:t>Problem Statement</a:t>
             </a:r>
           </a:p>
         </p:txBody>
@@ -9051,99 +8462,105 @@
             <a:spLocks noGrp="1"/>
           </p:cNvSpPr>
           <p:nvPr>
-            <p:ph idx="1"/>
-          </p:nvPr>
-        </p:nvSpPr>
-        <p:spPr>
-          <a:xfrm>
-            <a:off x="159620" y="2510653"/>
-            <a:ext cx="6991119" cy="3599316"/>
+            <p:ph sz="half" idx="1"/>
+          </p:nvPr>
+        </p:nvSpPr>
+        <p:spPr>
+          <a:xfrm>
+            <a:off x="394970" y="2397760"/>
+            <a:ext cx="9694545" cy="3895090"/>
           </a:xfrm>
         </p:spPr>
         <p:txBody>
           <a:bodyPr>
-            <a:normAutofit fontScale="92500" lnSpcReduction="10000"/>
+            <a:normAutofit/>
           </a:bodyPr>
           <a:lstStyle/>
           <a:p>
             <a:r>
-              <a:rPr lang="en-US" dirty="0" err="1"/>
+              <a:rPr lang="en-US" sz="2000" b="1" dirty="0">
+                <a:sym typeface="+mn-ea"/>
+              </a:rPr>
+              <a:t>Problem Statement:</a:t>
+            </a:r>
+            <a:r>
+              <a:rPr lang="en-US" sz="2000" dirty="0">
+                <a:sym typeface="+mn-ea"/>
+              </a:rPr>
+              <a:t> Our </a:t>
+            </a:r>
+            <a:r>
+              <a:rPr lang="en-US" sz="2000" dirty="0" err="1">
+                <a:sym typeface="+mn-ea"/>
+              </a:rPr>
               <a:t>FrankenBeer</a:t>
             </a:r>
             <a:r>
-              <a:rPr lang="en-US" dirty="0"/>
-              <a:t> was created to address a perceived ‘untapped’ demand for the crisp taste of high alcohol content beer without the bitterness which accompanies existing product offerings in this segment. </a:t>
-            </a:r>
-          </a:p>
-          <a:p>
-            <a:r>
-              <a:rPr lang="en-US" dirty="0"/>
-              <a:t>Our beer scientists have created a novel brewing technique enabling us to deliver 12% ABV at only 33 IBU’s  </a:t>
-            </a:r>
-          </a:p>
-          <a:p>
-            <a:r>
-              <a:rPr lang="en-US" dirty="0"/>
-              <a:t>The </a:t>
-            </a:r>
-            <a:r>
-              <a:rPr lang="en-US" dirty="0" err="1"/>
-              <a:t>ABRAcadabra</a:t>
-            </a:r>
-            <a:r>
-              <a:rPr lang="en-US" baseline="30000" dirty="0" err="1"/>
-              <a:t>TM</a:t>
-            </a:r>
-            <a:r>
-              <a:rPr lang="en-US" baseline="30000" dirty="0"/>
-              <a:t> </a:t>
-            </a:r>
-            <a:r>
-              <a:rPr lang="en-US" dirty="0"/>
-              <a:t> process (Alcohol Bitterness Reduction &amp; Abatement) has performed well within our dedicated team of full time tasters AND in initial test markets across multiple levels of ABV</a:t>
-            </a:r>
-          </a:p>
-          <a:p>
-            <a:endParaRPr lang="en-US" dirty="0"/>
-          </a:p>
-        </p:txBody>
-      </p:sp>
-      <p:pic>
-        <p:nvPicPr>
-          <p:cNvPr id="5" name="Picture 4">
-            <a:extLst>
-              <a:ext uri="{FF2B5EF4-FFF2-40B4-BE49-F238E27FC236}">
-                <a16:creationId xmlns:a16="http://schemas.microsoft.com/office/drawing/2014/main" id="{0C2158C5-EA90-0444-ACE2-C856EBB1F4EE}"/>
-              </a:ext>
-            </a:extLst>
-          </p:cNvPr>
-          <p:cNvPicPr>
-            <a:picLocks noChangeAspect="1"/>
-          </p:cNvPicPr>
-          <p:nvPr/>
-        </p:nvPicPr>
-        <p:blipFill>
-          <a:blip r:embed="rId2"/>
-          <a:stretch>
-            <a:fillRect/>
-          </a:stretch>
-        </p:blipFill>
-        <p:spPr>
-          <a:xfrm>
-            <a:off x="7446767" y="2677128"/>
-            <a:ext cx="4546451" cy="3432841"/>
-          </a:xfrm>
-          <a:prstGeom prst="rect">
-            <a:avLst/>
-          </a:prstGeom>
-        </p:spPr>
-      </p:pic>
+              <a:rPr lang="en-US" sz="2000" dirty="0">
+                <a:sym typeface="+mn-ea"/>
+              </a:rPr>
+              <a:t> has distinct qualities that make it appealing to many demographics of beer drinkers. This indicates that a thorough analysis must be done to target receptive markets. </a:t>
+            </a:r>
+          </a:p>
+          <a:p>
+            <a:pPr marL="0" indent="0">
+              <a:buNone/>
+            </a:pPr>
+            <a:endParaRPr lang="en-US" sz="2000" dirty="0">
+              <a:sym typeface="+mn-ea"/>
+            </a:endParaRPr>
+          </a:p>
+          <a:p>
+            <a:r>
+              <a:rPr lang="en-US" sz="2000" b="1" dirty="0"/>
+              <a:t>Current Condition: </a:t>
+            </a:r>
+            <a:r>
+              <a:rPr lang="en-US" sz="2000" dirty="0"/>
+              <a:t>Our </a:t>
+            </a:r>
+            <a:r>
+              <a:rPr lang="en-US" sz="2000" dirty="0" err="1"/>
+              <a:t>FrankenBeer</a:t>
+            </a:r>
+            <a:r>
+              <a:rPr lang="en-US" sz="2000" dirty="0"/>
+              <a:t> is a 12% ABV with a 33 IBU. It has tested well in the Seattle, Washington and Boulder, Colorado markets.</a:t>
+            </a:r>
+          </a:p>
+          <a:p>
+            <a:pPr marL="0" indent="0">
+              <a:buNone/>
+            </a:pPr>
+            <a:endParaRPr lang="en-US" sz="2000" dirty="0"/>
+          </a:p>
+          <a:p>
+            <a:r>
+              <a:rPr lang="en-US" sz="2000" b="1" dirty="0"/>
+              <a:t>Target Condition: </a:t>
+            </a:r>
+            <a:r>
+              <a:rPr lang="en-US" sz="2000" dirty="0"/>
+              <a:t>Expand the </a:t>
+            </a:r>
+            <a:r>
+              <a:rPr lang="en-US" sz="2000" dirty="0" err="1"/>
+              <a:t>FrankenBeer</a:t>
+            </a:r>
+            <a:r>
+              <a:rPr lang="en-US" sz="2000" dirty="0"/>
+              <a:t> to three new markets.</a:t>
+            </a:r>
+          </a:p>
+          <a:p>
+            <a:pPr marL="0" indent="0">
+              <a:buNone/>
+            </a:pPr>
+            <a:endParaRPr lang="en-US" sz="2000" dirty="0"/>
+          </a:p>
+        </p:txBody>
+      </p:sp>
     </p:spTree>
-    <p:extLst>
-      <p:ext uri="{BB962C8B-B14F-4D97-AF65-F5344CB8AC3E}">
-        <p14:creationId xmlns:p14="http://schemas.microsoft.com/office/powerpoint/2010/main" val="1108247251"/>
-      </p:ext>
-    </p:extLst>
   </p:cSld>
   <p:clrMapOvr>
     <a:masterClrMapping/>
@@ -9185,8 +8602,13 @@
           <a:p>
             <a:r>
               <a:rPr lang="en-US" dirty="0"/>
-              <a:t>Where do we go from here? </a:t>
-            </a:r>
+              <a:t>The Beer: </a:t>
+            </a:r>
+            <a:r>
+              <a:rPr lang="en-US" dirty="0" err="1"/>
+              <a:t>FrankenBeer</a:t>
+            </a:r>
+            <a:endParaRPr lang="en-US" dirty="0"/>
           </a:p>
         </p:txBody>
       </p:sp>
@@ -9197,38 +8619,34 @@
             <a:spLocks noGrp="1"/>
           </p:cNvSpPr>
           <p:nvPr>
-            <p:ph sz="half" idx="1"/>
-          </p:nvPr>
-        </p:nvSpPr>
-        <p:spPr>
-          <a:xfrm>
-            <a:off x="394970" y="2397760"/>
-            <a:ext cx="9694545" cy="3895090"/>
+            <p:ph idx="1"/>
+          </p:nvPr>
+        </p:nvSpPr>
+        <p:spPr>
+          <a:xfrm>
+            <a:off x="159620" y="2510653"/>
+            <a:ext cx="6991119" cy="3599316"/>
           </a:xfrm>
         </p:spPr>
         <p:txBody>
           <a:bodyPr>
-            <a:normAutofit/>
+            <a:normAutofit fontScale="92500" lnSpcReduction="10000"/>
           </a:bodyPr>
           <a:lstStyle/>
           <a:p>
             <a:r>
-              <a:rPr lang="en-US" dirty="0">
-                <a:sym typeface="+mn-ea"/>
-              </a:rPr>
-              <a:t>Our </a:t>
-            </a:r>
-            <a:r>
-              <a:rPr lang="en-US" dirty="0" err="1">
-                <a:sym typeface="+mn-ea"/>
-              </a:rPr>
+              <a:rPr lang="en-US" dirty="0" err="1"/>
               <a:t>FrankenBeer</a:t>
             </a:r>
             <a:r>
-              <a:rPr lang="en-US" dirty="0">
-                <a:sym typeface="+mn-ea"/>
-              </a:rPr>
-              <a:t> has distinct qualities that make it appealing customers who enjoy strong beers but dislike bitterness</a:t>
+              <a:rPr lang="en-US" dirty="0"/>
+              <a:t> was created to address a perceived ‘untapped’ demand for the crisp taste of high alcohol content beer without the bitterness which accompanies existing product offerings in this segment. </a:t>
+            </a:r>
+          </a:p>
+          <a:p>
+            <a:r>
+              <a:rPr lang="en-US" dirty="0"/>
+              <a:t>Our beer scientists have created a novel brewing technique enabling us to deliver 12% ABV at only 33 IBU’s  </a:t>
             </a:r>
           </a:p>
           <a:p>
@@ -9246,32 +8664,54 @@
             </a:r>
             <a:r>
               <a:rPr lang="en-US" baseline="30000" dirty="0"/>
-              <a:t>  </a:t>
-            </a:r>
-            <a:r>
-              <a:rPr lang="en-US" dirty="0">
-                <a:sym typeface="+mn-ea"/>
-              </a:rPr>
-              <a:t>process provides Franken Brewery a low-bitterness competitive advantage which extends across all alcohol content levels</a:t>
-            </a:r>
-          </a:p>
-          <a:p>
+              <a:t> </a:t>
+            </a:r>
             <a:r>
               <a:rPr lang="en-US" dirty="0"/>
-              <a:t>The Franken brewery seeks to begin distribution of </a:t>
-            </a:r>
-            <a:r>
-              <a:rPr lang="en-US" dirty="0" err="1"/>
-              <a:t>FrankenBeer</a:t>
-            </a:r>
-            <a:r>
-              <a:rPr lang="en-US" dirty="0"/>
-              <a:t> in three new states where it can most effectively bring this competitive advantage to bear</a:t>
-            </a:r>
-          </a:p>
-        </p:txBody>
-      </p:sp>
+              <a:t> process (Alcohol Bitterness Reduction &amp; Abatement) has performed well within our dedicated team of full time tasters AND in initial test markets across multiple levels of ABV</a:t>
+            </a:r>
+          </a:p>
+          <a:p>
+            <a:endParaRPr lang="en-US" dirty="0"/>
+          </a:p>
+        </p:txBody>
+      </p:sp>
+      <p:pic>
+        <p:nvPicPr>
+          <p:cNvPr id="5" name="Picture 4">
+            <a:extLst>
+              <a:ext uri="{FF2B5EF4-FFF2-40B4-BE49-F238E27FC236}">
+                <a16:creationId xmlns:a16="http://schemas.microsoft.com/office/drawing/2014/main" id="{0C2158C5-EA90-0444-ACE2-C856EBB1F4EE}"/>
+              </a:ext>
+            </a:extLst>
+          </p:cNvPr>
+          <p:cNvPicPr>
+            <a:picLocks noChangeAspect="1"/>
+          </p:cNvPicPr>
+          <p:nvPr/>
+        </p:nvPicPr>
+        <p:blipFill>
+          <a:blip r:embed="rId2"/>
+          <a:stretch>
+            <a:fillRect/>
+          </a:stretch>
+        </p:blipFill>
+        <p:spPr>
+          <a:xfrm>
+            <a:off x="7446767" y="2677128"/>
+            <a:ext cx="4546451" cy="3432841"/>
+          </a:xfrm>
+          <a:prstGeom prst="rect">
+            <a:avLst/>
+          </a:prstGeom>
+        </p:spPr>
+      </p:pic>
     </p:spTree>
+    <p:extLst>
+      <p:ext uri="{BB962C8B-B14F-4D97-AF65-F5344CB8AC3E}">
+        <p14:creationId xmlns:p14="http://schemas.microsoft.com/office/powerpoint/2010/main" val="2530349246"/>
+      </p:ext>
+    </p:extLst>
   </p:cSld>
   <p:clrMapOvr>
     <a:masterClrMapping/>
@@ -9370,19 +8810,7 @@
               <a:rPr lang="en-US" sz="2000" dirty="0">
                 <a:sym typeface="+mn-ea"/>
               </a:rPr>
-              <a:t>Colorado already has the highest ABV craft beer in the country--Lee Hill Series Vol. 5 - Belgian Style </a:t>
-            </a:r>
-            <a:r>
-              <a:rPr lang="en-US" sz="2000" dirty="0" err="1">
-                <a:sym typeface="+mn-ea"/>
-              </a:rPr>
-              <a:t>Quadrupel</a:t>
-            </a:r>
-            <a:r>
-              <a:rPr lang="en-US" sz="2000" dirty="0">
-                <a:sym typeface="+mn-ea"/>
-              </a:rPr>
-              <a:t> Ale (ABV 12.8%)</a:t>
+              <a:t>Colorado already has the highest ABV craft beer in the country--Lee Hill Series Vol. 5 - Belgian Style Quadrupel Ale (ABV 12.8%)</a:t>
             </a:r>
           </a:p>
           <a:p>
@@ -9554,49 +8982,54 @@
         <p:spPr>
           <a:xfrm>
             <a:off x="329565" y="2302510"/>
-            <a:ext cx="5632082" cy="4197985"/>
+            <a:ext cx="6370320" cy="4197985"/>
           </a:xfrm>
         </p:spPr>
         <p:txBody>
           <a:bodyPr>
-            <a:normAutofit fontScale="97500"/>
+            <a:normAutofit fontScale="90000" lnSpcReduction="10000"/>
           </a:bodyPr>
           <a:lstStyle/>
           <a:p>
             <a:r>
-              <a:rPr lang="en-US" dirty="0"/>
-              <a:t>To assist with target market identification, our data scientists (in a flash of brilliance) have created the </a:t>
-            </a:r>
-            <a:r>
-              <a:rPr lang="en-US" dirty="0" err="1"/>
-              <a:t>FrankenScore</a:t>
-            </a:r>
-            <a:r>
-              <a:rPr lang="en-US" baseline="30000" dirty="0" err="1"/>
-              <a:t>TM</a:t>
-            </a:r>
-            <a:r>
-              <a:rPr lang="en-US" dirty="0"/>
-              <a:t> which is the product of the median ABV by state and the median IBU by state</a:t>
-            </a:r>
-          </a:p>
-          <a:p>
-            <a:r>
-              <a:rPr lang="en-US" dirty="0"/>
-              <a:t>This metric sizes the relative advantage Franken’s new proprietary technique might have</a:t>
-            </a:r>
-          </a:p>
-          <a:p>
-            <a:r>
-              <a:rPr lang="en-US" dirty="0"/>
-              <a:t>WV, NM, &amp; FL were identified as having the highest market potential</a:t>
-            </a:r>
+              <a:rPr lang="en-US" dirty="0">
+                <a:sym typeface="+mn-ea"/>
+              </a:rPr>
+              <a:t>The second phase–and the reason for our presentation to you today–is to seek to expand into our three new test markets: San Antonio, Texas; Salt Lake City, Utah; and Boston, Massachusetts. </a:t>
+            </a:r>
+          </a:p>
+          <a:p>
+            <a:endParaRPr lang="en-US" dirty="0">
+              <a:sym typeface="+mn-ea"/>
+            </a:endParaRPr>
+          </a:p>
+          <a:p>
+            <a:r>
+              <a:rPr lang="en-US" dirty="0">
+                <a:sym typeface="+mn-ea"/>
+              </a:rPr>
+              <a:t>Each of these markets has a different craft beer presence, but none like our FrankenBeer. </a:t>
+            </a:r>
+          </a:p>
+          <a:p>
+            <a:endParaRPr lang="en-US" dirty="0">
+              <a:sym typeface="+mn-ea"/>
+            </a:endParaRPr>
+          </a:p>
+          <a:p>
+            <a:r>
+              <a:rPr lang="en-US" dirty="0">
+                <a:sym typeface="+mn-ea"/>
+              </a:rPr>
+              <a:t>With its high octane ABV of 12% and its subtle IBU of 33, we believe our FrankenBeer will leave its mark these new markets.</a:t>
+            </a:r>
+            <a:endParaRPr lang="en-US" dirty="0"/>
           </a:p>
           <a:p>
             <a:pPr marL="0" indent="0">
               <a:buNone/>
             </a:pPr>
-            <a:endParaRPr lang="en-US" dirty="0"/>
+            <a:endParaRPr lang="en-US"/>
           </a:p>
           <a:p>
             <a:endParaRPr lang="en-US" dirty="0"/>
@@ -9605,27 +9038,13 @@
       </p:sp>
       <p:graphicFrame>
         <p:nvGraphicFramePr>
-          <p:cNvPr id="8" name="Table 7">
-            <a:extLst>
-              <a:ext uri="{FF2B5EF4-FFF2-40B4-BE49-F238E27FC236}">
-                <a16:creationId xmlns:a16="http://schemas.microsoft.com/office/drawing/2014/main" id="{B8166CE9-B9C1-DF46-8BF9-C94F27ACB02A}"/>
-              </a:ext>
-            </a:extLst>
-          </p:cNvPr>
-          <p:cNvGraphicFramePr>
-            <a:graphicFrameLocks noGrp="1"/>
-          </p:cNvGraphicFramePr>
-          <p:nvPr>
-            <p:extLst>
-              <p:ext uri="{D42A27DB-BD31-4B8C-83A1-F6EECF244321}">
-                <p14:modId xmlns:p14="http://schemas.microsoft.com/office/powerpoint/2010/main" val="1321123918"/>
-              </p:ext>
-            </p:extLst>
-          </p:nvPr>
+          <p:cNvPr id="4" name="Table 3"/>
+          <p:cNvGraphicFramePr/>
+          <p:nvPr/>
         </p:nvGraphicFramePr>
         <p:xfrm>
-          <a:off x="6032409" y="2302510"/>
-          <a:ext cx="5907416" cy="2400442"/>
+          <a:off x="6779895" y="2852420"/>
+          <a:ext cx="5344795" cy="2578735"/>
         </p:xfrm>
         <a:graphic>
           <a:graphicData uri="http://schemas.openxmlformats.org/drawingml/2006/table">
@@ -9634,242 +9053,66 @@
                 <a:tableStyleId>{5C22544A-7EE6-4342-B048-85BDC9FD1C3A}</a:tableStyleId>
               </a:tblPr>
               <a:tblGrid>
-                <a:gridCol w="1697231">
+                <a:gridCol w="878840">
                   <a:extLst>
                     <a:ext uri="{9D8B030D-6E8A-4147-A177-3AD203B41FA5}">
-                      <a16:colId xmlns:a16="http://schemas.microsoft.com/office/drawing/2014/main" val="1788224616"/>
+                      <a16:colId xmlns:a16="http://schemas.microsoft.com/office/drawing/2014/main" val="20000"/>
                     </a:ext>
                   </a:extLst>
                 </a:gridCol>
-                <a:gridCol w="953871">
+                <a:gridCol w="879475">
                   <a:extLst>
                     <a:ext uri="{9D8B030D-6E8A-4147-A177-3AD203B41FA5}">
-                      <a16:colId xmlns:a16="http://schemas.microsoft.com/office/drawing/2014/main" val="1603369086"/>
+                      <a16:colId xmlns:a16="http://schemas.microsoft.com/office/drawing/2014/main" val="20001"/>
                     </a:ext>
                   </a:extLst>
                 </a:gridCol>
-                <a:gridCol w="937515">
+                <a:gridCol w="942340">
                   <a:extLst>
                     <a:ext uri="{9D8B030D-6E8A-4147-A177-3AD203B41FA5}">
-                      <a16:colId xmlns:a16="http://schemas.microsoft.com/office/drawing/2014/main" val="2574628609"/>
+                      <a16:colId xmlns:a16="http://schemas.microsoft.com/office/drawing/2014/main" val="20002"/>
                     </a:ext>
                   </a:extLst>
                 </a:gridCol>
-                <a:gridCol w="812344">
+                <a:gridCol w="941070">
                   <a:extLst>
                     <a:ext uri="{9D8B030D-6E8A-4147-A177-3AD203B41FA5}">
-                      <a16:colId xmlns:a16="http://schemas.microsoft.com/office/drawing/2014/main" val="3066243513"/>
+                      <a16:colId xmlns:a16="http://schemas.microsoft.com/office/drawing/2014/main" val="20003"/>
                     </a:ext>
                   </a:extLst>
                 </a:gridCol>
-                <a:gridCol w="795988">
+                <a:gridCol w="880745">
                   <a:extLst>
                     <a:ext uri="{9D8B030D-6E8A-4147-A177-3AD203B41FA5}">
-                      <a16:colId xmlns:a16="http://schemas.microsoft.com/office/drawing/2014/main" val="116160893"/>
+                      <a16:colId xmlns:a16="http://schemas.microsoft.com/office/drawing/2014/main" val="20004"/>
                     </a:ext>
                   </a:extLst>
                 </a:gridCol>
-                <a:gridCol w="710467">
+                <a:gridCol w="822325">
                   <a:extLst>
                     <a:ext uri="{9D8B030D-6E8A-4147-A177-3AD203B41FA5}">
-                      <a16:colId xmlns:a16="http://schemas.microsoft.com/office/drawing/2014/main" val="1801927599"/>
+                      <a16:colId xmlns:a16="http://schemas.microsoft.com/office/drawing/2014/main" val="20005"/>
                     </a:ext>
                   </a:extLst>
                 </a:gridCol>
               </a:tblGrid>
-              <a:tr h="724677">
+              <a:tr h="833755">
                 <a:tc>
                   <a:txBody>
                     <a:bodyPr/>
                     <a:lstStyle/>
                     <a:p>
-                      <a:pPr algn="l" fontAlgn="t"/>
-                      <a:r>
-                        <a:rPr lang="en-US" sz="1800" u="none" strike="noStrike">
-                          <a:effectLst/>
-                        </a:rPr>
-                        <a:t> </a:t>
-                      </a:r>
-                      <a:endParaRPr lang="en-US" sz="1800" b="0" i="0" u="none" strike="noStrike">
-                        <a:solidFill>
-                          <a:srgbClr val="000000"/>
-                        </a:solidFill>
-                        <a:effectLst/>
-                        <a:latin typeface="Arial" panose="020B0604020202020204" pitchFamily="34" charset="0"/>
-                      </a:endParaRPr>
+                      <a:pPr>
+                        <a:buNone/>
+                      </a:pPr>
+                      <a:endParaRPr lang="en-US" sz="1400"/>
                     </a:p>
                   </a:txBody>
-                  <a:tcPr marL="9525" marR="9525" marT="9525" marB="0"/>
-                </a:tc>
-                <a:tc>
-                  <a:txBody>
-                    <a:bodyPr/>
-                    <a:lstStyle/>
-                    <a:p>
-                      <a:pPr algn="ctr" rtl="0" fontAlgn="ctr"/>
-                      <a:r>
-                        <a:rPr lang="en-US" sz="1600" u="none" strike="noStrike" dirty="0">
-                          <a:effectLst/>
-                        </a:rPr>
-                        <a:t>Seattle</a:t>
-                      </a:r>
-                      <a:endParaRPr lang="en-US" sz="1600" b="1" i="0" u="none" strike="noStrike" dirty="0">
-                        <a:solidFill>
-                          <a:srgbClr val="FFFFFF"/>
-                        </a:solidFill>
-                        <a:effectLst/>
-                        <a:latin typeface="Trebuchet MS" panose="020B0703020202090204" pitchFamily="34" charset="0"/>
-                      </a:endParaRPr>
-                    </a:p>
-                  </a:txBody>
-                  <a:tcPr marL="9525" marR="9525" marT="9525" marB="0" anchor="ctr"/>
-                </a:tc>
-                <a:tc>
-                  <a:txBody>
-                    <a:bodyPr/>
-                    <a:lstStyle/>
-                    <a:p>
-                      <a:pPr algn="ctr" rtl="0" fontAlgn="ctr"/>
-                      <a:r>
-                        <a:rPr lang="en-US" sz="1600" u="none" strike="noStrike">
-                          <a:effectLst/>
-                        </a:rPr>
-                        <a:t>Boulder</a:t>
-                      </a:r>
-                      <a:endParaRPr lang="en-US" sz="1600" b="1" i="0" u="none" strike="noStrike">
-                        <a:solidFill>
-                          <a:srgbClr val="FFFFFF"/>
-                        </a:solidFill>
-                        <a:effectLst/>
-                        <a:latin typeface="Trebuchet MS" panose="020B0703020202090204" pitchFamily="34" charset="0"/>
-                      </a:endParaRPr>
-                    </a:p>
-                  </a:txBody>
-                  <a:tcPr marL="9525" marR="9525" marT="9525" marB="0" anchor="ctr"/>
-                </a:tc>
-                <a:tc>
-                  <a:txBody>
-                    <a:bodyPr/>
-                    <a:lstStyle/>
-                    <a:p>
-                      <a:pPr algn="ctr" rtl="0" fontAlgn="ctr"/>
-                      <a:r>
-                        <a:rPr lang="en-US" sz="1600" u="none" strike="noStrike">
-                          <a:effectLst/>
-                        </a:rPr>
-                        <a:t>West Virginia</a:t>
-                      </a:r>
-                      <a:endParaRPr lang="en-US" sz="1600" b="1" i="0" u="none" strike="noStrike">
-                        <a:solidFill>
-                          <a:srgbClr val="FFFFFF"/>
-                        </a:solidFill>
-                        <a:effectLst/>
-                        <a:latin typeface="Trebuchet MS" panose="020B0703020202090204" pitchFamily="34" charset="0"/>
-                      </a:endParaRPr>
-                    </a:p>
-                  </a:txBody>
-                  <a:tcPr marL="9525" marR="9525" marT="9525" marB="0" anchor="ctr"/>
-                </a:tc>
-                <a:tc>
-                  <a:txBody>
-                    <a:bodyPr/>
-                    <a:lstStyle/>
-                    <a:p>
-                      <a:pPr algn="ctr" rtl="0" fontAlgn="ctr"/>
-                      <a:r>
-                        <a:rPr lang="en-US" sz="1600" u="none" strike="noStrike">
-                          <a:effectLst/>
-                        </a:rPr>
-                        <a:t>New Mexico</a:t>
-                      </a:r>
-                      <a:endParaRPr lang="en-US" sz="1600" b="1" i="0" u="none" strike="noStrike">
-                        <a:solidFill>
-                          <a:srgbClr val="FFFFFF"/>
-                        </a:solidFill>
-                        <a:effectLst/>
-                        <a:latin typeface="Trebuchet MS" panose="020B0703020202090204" pitchFamily="34" charset="0"/>
-                      </a:endParaRPr>
-                    </a:p>
-                  </a:txBody>
-                  <a:tcPr marL="9525" marR="9525" marT="9525" marB="0" anchor="ctr"/>
-                </a:tc>
-                <a:tc>
-                  <a:txBody>
-                    <a:bodyPr/>
-                    <a:lstStyle/>
-                    <a:p>
-                      <a:pPr algn="ctr" rtl="0" fontAlgn="ctr"/>
-                      <a:r>
-                        <a:rPr lang="en-US" sz="1600" u="none" strike="noStrike">
-                          <a:effectLst/>
-                        </a:rPr>
-                        <a:t>Florida</a:t>
-                      </a:r>
-                      <a:endParaRPr lang="en-US" sz="1600" b="1" i="0" u="none" strike="noStrike">
-                        <a:solidFill>
-                          <a:srgbClr val="FFFFFF"/>
-                        </a:solidFill>
-                        <a:effectLst/>
-                        <a:latin typeface="Trebuchet MS" panose="020B0703020202090204" pitchFamily="34" charset="0"/>
-                      </a:endParaRPr>
-                    </a:p>
-                  </a:txBody>
-                  <a:tcPr marL="9525" marR="9525" marT="9525" marB="0" anchor="ctr"/>
-                </a:tc>
-                <a:extLst>
-                  <a:ext uri="{0D108BD9-81ED-4DB2-BD59-A6C34878D82A}">
-                    <a16:rowId xmlns:a16="http://schemas.microsoft.com/office/drawing/2014/main" val="848178998"/>
-                  </a:ext>
-                </a:extLst>
-              </a:tr>
-              <a:tr h="317500">
-                <a:tc>
-                  <a:txBody>
-                    <a:bodyPr/>
-                    <a:lstStyle/>
-                    <a:p>
-                      <a:pPr algn="ctr" rtl="0" fontAlgn="ctr"/>
-                      <a:r>
-                        <a:rPr lang="en-US" sz="1800" u="none" strike="noStrike">
-                          <a:effectLst/>
-                        </a:rPr>
-                        <a:t>Median ABV</a:t>
-                      </a:r>
-                      <a:endParaRPr lang="en-US" sz="1800" b="0" i="0" u="none" strike="noStrike">
-                        <a:solidFill>
-                          <a:srgbClr val="000000"/>
-                        </a:solidFill>
-                        <a:effectLst/>
-                        <a:latin typeface="Trebuchet MS" panose="020B0703020202090204" pitchFamily="34" charset="0"/>
-                      </a:endParaRPr>
-                    </a:p>
-                  </a:txBody>
-                  <a:tcPr marL="9525" marR="9525" marT="9525" marB="0" anchor="ctr"/>
-                </a:tc>
-                <a:tc>
-                  <a:txBody>
-                    <a:bodyPr/>
-                    <a:lstStyle/>
-                    <a:p>
-                      <a:pPr algn="ctr" rtl="0" fontAlgn="ctr"/>
-                      <a:r>
-                        <a:rPr lang="en-US" sz="1800" u="none" strike="noStrike" dirty="0">
-                          <a:effectLst/>
-                        </a:rPr>
-                        <a:t>6.35%</a:t>
-                      </a:r>
-                      <a:endParaRPr lang="en-US" sz="1800" b="0" i="0" u="none" strike="noStrike" dirty="0">
-                        <a:solidFill>
-                          <a:srgbClr val="000000"/>
-                        </a:solidFill>
-                        <a:effectLst/>
-                        <a:latin typeface="Trebuchet MS" panose="020B0703020202090204" pitchFamily="34" charset="0"/>
-                      </a:endParaRPr>
-                    </a:p>
-                  </a:txBody>
-                  <a:tcPr marL="9525" marR="9525" marT="9525" marB="0" anchor="ctr">
+                  <a:tcPr>
                     <a:solidFill>
-                      <a:schemeClr val="accent2"/>
+                      <a:schemeClr val="accent2">
+                        <a:lumMod val="75000"/>
+                      </a:schemeClr>
                     </a:solidFill>
                   </a:tcPr>
                 </a:tc>
@@ -9878,25 +9121,20 @@
                     <a:bodyPr/>
                     <a:lstStyle/>
                     <a:p>
-                      <a:pPr algn="ctr" rtl="0" fontAlgn="ctr"/>
+                      <a:pPr algn="ctr">
+                        <a:buNone/>
+                      </a:pPr>
                       <a:r>
-                        <a:rPr lang="en-US" sz="1800" u="none" strike="noStrike" dirty="0">
-                          <a:effectLst/>
-                        </a:rPr>
-                        <a:t>5.95%</a:t>
+                        <a:rPr lang="en-US" sz="1600"/>
+                        <a:t>Seattle</a:t>
                       </a:r>
-                      <a:endParaRPr lang="en-US" sz="1800" b="0" i="0" u="none" strike="noStrike" dirty="0">
-                        <a:solidFill>
-                          <a:srgbClr val="000000"/>
-                        </a:solidFill>
-                        <a:effectLst/>
-                        <a:latin typeface="Trebuchet MS" panose="020B0703020202090204" pitchFamily="34" charset="0"/>
-                      </a:endParaRPr>
                     </a:p>
                   </a:txBody>
-                  <a:tcPr marL="9525" marR="9525" marT="9525" marB="0" anchor="ctr">
+                  <a:tcPr>
                     <a:solidFill>
-                      <a:schemeClr val="accent2"/>
+                      <a:schemeClr val="accent2">
+                        <a:lumMod val="75000"/>
+                      </a:schemeClr>
                     </a:solidFill>
                   </a:tcPr>
                 </a:tc>
@@ -9905,25 +9143,20 @@
                     <a:bodyPr/>
                     <a:lstStyle/>
                     <a:p>
-                      <a:pPr algn="ctr" rtl="0" fontAlgn="ctr"/>
+                      <a:pPr algn="ctr">
+                        <a:buNone/>
+                      </a:pPr>
                       <a:r>
-                        <a:rPr lang="en-US" sz="1800" u="none" strike="noStrike" dirty="0">
-                          <a:effectLst/>
-                        </a:rPr>
-                        <a:t>6.20%</a:t>
+                        <a:rPr lang="en-US" sz="1600"/>
+                        <a:t>Boulder</a:t>
                       </a:r>
-                      <a:endParaRPr lang="en-US" sz="1800" b="0" i="0" u="none" strike="noStrike" dirty="0">
-                        <a:solidFill>
-                          <a:srgbClr val="000000"/>
-                        </a:solidFill>
-                        <a:effectLst/>
-                        <a:latin typeface="Trebuchet MS" panose="020B0703020202090204" pitchFamily="34" charset="0"/>
-                      </a:endParaRPr>
                     </a:p>
                   </a:txBody>
-                  <a:tcPr marL="9525" marR="9525" marT="9525" marB="0" anchor="ctr">
+                  <a:tcPr>
                     <a:solidFill>
-                      <a:schemeClr val="accent3"/>
+                      <a:schemeClr val="accent2">
+                        <a:lumMod val="75000"/>
+                      </a:schemeClr>
                     </a:solidFill>
                   </a:tcPr>
                 </a:tc>
@@ -9932,567 +9165,290 @@
                     <a:bodyPr/>
                     <a:lstStyle/>
                     <a:p>
-                      <a:pPr algn="ctr" rtl="0" fontAlgn="ctr"/>
+                      <a:pPr algn="ctr">
+                        <a:buNone/>
+                      </a:pPr>
                       <a:r>
-                        <a:rPr lang="en-US" sz="1800" u="none" strike="noStrike" dirty="0">
-                          <a:effectLst/>
-                        </a:rPr>
-                        <a:t>6.20%</a:t>
+                        <a:rPr lang="en-US" sz="1600"/>
+                        <a:t>San Antonio</a:t>
                       </a:r>
-                      <a:endParaRPr lang="en-US" sz="1800" b="0" i="0" u="none" strike="noStrike" dirty="0">
-                        <a:solidFill>
-                          <a:srgbClr val="000000"/>
-                        </a:solidFill>
-                        <a:effectLst/>
-                        <a:latin typeface="Trebuchet MS" panose="020B0703020202090204" pitchFamily="34" charset="0"/>
-                      </a:endParaRPr>
                     </a:p>
                   </a:txBody>
-                  <a:tcPr marL="9525" marR="9525" marT="9525" marB="0" anchor="ctr">
-                    <a:solidFill>
-                      <a:schemeClr val="accent3"/>
-                    </a:solidFill>
-                  </a:tcPr>
+                  <a:tcPr/>
                 </a:tc>
                 <a:tc>
                   <a:txBody>
                     <a:bodyPr/>
                     <a:lstStyle/>
                     <a:p>
-                      <a:pPr algn="ctr" rtl="0" fontAlgn="ctr"/>
+                      <a:pPr algn="ctr">
+                        <a:buNone/>
+                      </a:pPr>
                       <a:r>
-                        <a:rPr lang="en-US" sz="1800" u="none" strike="noStrike">
-                          <a:effectLst/>
-                        </a:rPr>
-                        <a:t>5.70%</a:t>
+                        <a:rPr lang="en-US" sz="1600"/>
+                        <a:t>Boston</a:t>
                       </a:r>
-                      <a:endParaRPr lang="en-US" sz="1800" b="0" i="0" u="none" strike="noStrike">
-                        <a:solidFill>
-                          <a:srgbClr val="000000"/>
-                        </a:solidFill>
-                        <a:effectLst/>
-                        <a:latin typeface="Trebuchet MS" panose="020B0703020202090204" pitchFamily="34" charset="0"/>
-                      </a:endParaRPr>
                     </a:p>
                   </a:txBody>
-                  <a:tcPr marL="9525" marR="9525" marT="9525" marB="0" anchor="ctr">
-                    <a:solidFill>
-                      <a:schemeClr val="accent3"/>
-                    </a:solidFill>
-                  </a:tcPr>
-                </a:tc>
-                <a:extLst>
-                  <a:ext uri="{0D108BD9-81ED-4DB2-BD59-A6C34878D82A}">
-                    <a16:rowId xmlns:a16="http://schemas.microsoft.com/office/drawing/2014/main" val="2029064677"/>
-                  </a:ext>
-                </a:extLst>
-              </a:tr>
-              <a:tr h="304800">
-                <a:tc>
-                  <a:txBody>
-                    <a:bodyPr/>
-                    <a:lstStyle/>
-                    <a:p>
-                      <a:pPr algn="ctr" rtl="0" fontAlgn="ctr"/>
-                      <a:r>
-                        <a:rPr lang="en-US" sz="1800" u="none" strike="noStrike">
-                          <a:effectLst/>
-                        </a:rPr>
-                        <a:t>Median IBU</a:t>
-                      </a:r>
-                      <a:endParaRPr lang="en-US" sz="1800" b="0" i="0" u="none" strike="noStrike">
-                        <a:solidFill>
-                          <a:srgbClr val="000000"/>
-                        </a:solidFill>
-                        <a:effectLst/>
-                        <a:latin typeface="Trebuchet MS" panose="020B0703020202090204" pitchFamily="34" charset="0"/>
-                      </a:endParaRPr>
-                    </a:p>
-                  </a:txBody>
-                  <a:tcPr marL="9525" marR="9525" marT="9525" marB="0" anchor="ctr"/>
+                  <a:tcPr/>
                 </a:tc>
                 <a:tc>
                   <a:txBody>
                     <a:bodyPr/>
                     <a:lstStyle/>
                     <a:p>
-                      <a:pPr algn="ctr" rtl="0" fontAlgn="ctr"/>
+                      <a:pPr algn="ctr">
+                        <a:buNone/>
+                      </a:pPr>
                       <a:r>
-                        <a:rPr lang="en-US" sz="1800" u="none" strike="noStrike">
-                          <a:effectLst/>
-                        </a:rPr>
-                        <a:t>75</a:t>
+                        <a:rPr lang="en-US" sz="1600"/>
+                        <a:t>Salt Lake </a:t>
                       </a:r>
-                      <a:endParaRPr lang="en-US" sz="1800" b="0" i="0" u="none" strike="noStrike">
-                        <a:solidFill>
-                          <a:srgbClr val="000000"/>
-                        </a:solidFill>
-                        <a:effectLst/>
-                        <a:latin typeface="Trebuchet MS" panose="020B0703020202090204" pitchFamily="34" charset="0"/>
-                      </a:endParaRPr>
+                    </a:p>
+                    <a:p>
+                      <a:pPr algn="ctr">
+                        <a:buNone/>
+                      </a:pPr>
+                      <a:r>
+                        <a:rPr lang="en-US" sz="1600"/>
+                        <a:t>City</a:t>
+                      </a:r>
                     </a:p>
                   </a:txBody>
-                  <a:tcPr marL="9525" marR="9525" marT="9525" marB="0" anchor="ctr">
-                    <a:solidFill>
-                      <a:schemeClr val="accent2"/>
-                    </a:solidFill>
-                  </a:tcPr>
+                  <a:tcPr/>
+                </a:tc>
+                <a:extLst>
+                  <a:ext uri="{0D108BD9-81ED-4DB2-BD59-A6C34878D82A}">
+                    <a16:rowId xmlns:a16="http://schemas.microsoft.com/office/drawing/2014/main" val="10000"/>
+                  </a:ext>
+                </a:extLst>
+              </a:tr>
+              <a:tr h="854075">
+                <a:tc>
+                  <a:txBody>
+                    <a:bodyPr/>
+                    <a:lstStyle/>
+                    <a:p>
+                      <a:pPr algn="ctr">
+                        <a:buNone/>
+                      </a:pPr>
+                      <a:r>
+                        <a:rPr lang="en-US" sz="1800"/>
+                        <a:t>ABV </a:t>
+                      </a:r>
+                      <a:r>
+                        <a:rPr lang="en-US" sz="1400"/>
+                        <a:t>(avg)</a:t>
+                      </a:r>
+                    </a:p>
+                  </a:txBody>
+                  <a:tcPr/>
                 </a:tc>
                 <a:tc>
                   <a:txBody>
                     <a:bodyPr/>
                     <a:lstStyle/>
                     <a:p>
-                      <a:pPr algn="ctr" rtl="0" fontAlgn="ctr"/>
+                      <a:pPr algn="ctr">
+                        <a:buNone/>
+                      </a:pPr>
                       <a:r>
-                        <a:rPr lang="en-US" sz="1800" u="none" strike="noStrike">
-                          <a:effectLst/>
-                        </a:rPr>
-                        <a:t>31</a:t>
+                        <a:rPr lang="en-US" sz="1800"/>
+                        <a:t>6.35%</a:t>
                       </a:r>
-                      <a:endParaRPr lang="en-US" sz="1800" b="0" i="0" u="none" strike="noStrike">
-                        <a:solidFill>
-                          <a:srgbClr val="000000"/>
-                        </a:solidFill>
-                        <a:effectLst/>
-                        <a:latin typeface="Trebuchet MS" panose="020B0703020202090204" pitchFamily="34" charset="0"/>
-                      </a:endParaRPr>
                     </a:p>
                   </a:txBody>
-                  <a:tcPr marL="9525" marR="9525" marT="9525" marB="0" anchor="ctr">
-                    <a:solidFill>
-                      <a:schemeClr val="accent2"/>
-                    </a:solidFill>
-                  </a:tcPr>
+                  <a:tcPr/>
                 </a:tc>
                 <a:tc>
                   <a:txBody>
                     <a:bodyPr/>
                     <a:lstStyle/>
                     <a:p>
-                      <a:pPr algn="ctr" rtl="0" fontAlgn="ctr"/>
+                      <a:pPr algn="ctr">
+                        <a:buNone/>
+                      </a:pPr>
                       <a:r>
-                        <a:rPr lang="en-US" sz="1800" u="none" strike="noStrike">
-                          <a:effectLst/>
-                        </a:rPr>
-                        <a:t>57.5</a:t>
+                        <a:rPr lang="en-US" sz="1800"/>
+                        <a:t>5.95%</a:t>
                       </a:r>
-                      <a:endParaRPr lang="en-US" sz="1800" b="0" i="0" u="none" strike="noStrike">
-                        <a:solidFill>
-                          <a:srgbClr val="000000"/>
-                        </a:solidFill>
-                        <a:effectLst/>
-                        <a:latin typeface="Trebuchet MS" panose="020B0703020202090204" pitchFamily="34" charset="0"/>
-                      </a:endParaRPr>
                     </a:p>
                   </a:txBody>
-                  <a:tcPr marL="9525" marR="9525" marT="9525" marB="0" anchor="ctr">
-                    <a:solidFill>
-                      <a:schemeClr val="accent3"/>
-                    </a:solidFill>
-                  </a:tcPr>
+                  <a:tcPr/>
                 </a:tc>
                 <a:tc>
                   <a:txBody>
                     <a:bodyPr/>
                     <a:lstStyle/>
                     <a:p>
-                      <a:pPr algn="ctr" rtl="0" fontAlgn="ctr"/>
+                      <a:pPr algn="ctr">
+                        <a:buNone/>
+                      </a:pPr>
                       <a:r>
-                        <a:rPr lang="en-US" sz="1800" u="none" strike="noStrike" dirty="0">
-                          <a:effectLst/>
-                        </a:rPr>
-                        <a:t>51</a:t>
+                        <a:rPr lang="en-US" sz="1800"/>
+                        <a:t>5.95%</a:t>
                       </a:r>
-                      <a:endParaRPr lang="en-US" sz="1800" b="0" i="0" u="none" strike="noStrike" dirty="0">
-                        <a:solidFill>
-                          <a:srgbClr val="000000"/>
-                        </a:solidFill>
-                        <a:effectLst/>
-                        <a:latin typeface="Trebuchet MS" panose="020B0703020202090204" pitchFamily="34" charset="0"/>
-                      </a:endParaRPr>
                     </a:p>
                   </a:txBody>
-                  <a:tcPr marL="9525" marR="9525" marT="9525" marB="0" anchor="ctr">
-                    <a:solidFill>
-                      <a:schemeClr val="accent3"/>
-                    </a:solidFill>
-                  </a:tcPr>
+                  <a:tcPr/>
                 </a:tc>
                 <a:tc>
                   <a:txBody>
                     <a:bodyPr/>
                     <a:lstStyle/>
                     <a:p>
-                      <a:pPr algn="ctr" rtl="0" fontAlgn="ctr"/>
+                      <a:pPr algn="ctr">
+                        <a:buNone/>
+                      </a:pPr>
                       <a:r>
-                        <a:rPr lang="en-US" sz="1800" u="none" strike="noStrike">
-                          <a:effectLst/>
-                        </a:rPr>
-                        <a:t>55</a:t>
+                        <a:rPr lang="en-US" sz="1800"/>
+                        <a:t>5.6%</a:t>
                       </a:r>
-                      <a:endParaRPr lang="en-US" sz="1800" b="0" i="0" u="none" strike="noStrike">
-                        <a:solidFill>
-                          <a:srgbClr val="000000"/>
-                        </a:solidFill>
-                        <a:effectLst/>
-                        <a:latin typeface="Trebuchet MS" panose="020B0703020202090204" pitchFamily="34" charset="0"/>
-                      </a:endParaRPr>
                     </a:p>
                   </a:txBody>
-                  <a:tcPr marL="9525" marR="9525" marT="9525" marB="0" anchor="ctr">
-                    <a:solidFill>
-                      <a:schemeClr val="accent3"/>
-                    </a:solidFill>
-                  </a:tcPr>
-                </a:tc>
-                <a:extLst>
-                  <a:ext uri="{0D108BD9-81ED-4DB2-BD59-A6C34878D82A}">
-                    <a16:rowId xmlns:a16="http://schemas.microsoft.com/office/drawing/2014/main" val="1697238585"/>
-                  </a:ext>
-                </a:extLst>
-              </a:tr>
-              <a:tr h="495300">
-                <a:tc>
-                  <a:txBody>
-                    <a:bodyPr/>
-                    <a:lstStyle/>
-                    <a:p>
-                      <a:pPr algn="ctr" rtl="0" fontAlgn="ctr"/>
-                      <a:r>
-                        <a:rPr lang="en-US" sz="1800" u="none" strike="noStrike" dirty="0" err="1">
-                          <a:effectLst/>
-                        </a:rPr>
-                        <a:t>FrankenScore</a:t>
-                      </a:r>
-                      <a:r>
-                        <a:rPr lang="en-US" baseline="30000" dirty="0" err="1"/>
-                        <a:t>TM</a:t>
-                      </a:r>
-                      <a:endParaRPr lang="en-US" sz="1800" b="0" i="0" u="none" strike="noStrike" dirty="0">
-                        <a:solidFill>
-                          <a:srgbClr val="000000"/>
-                        </a:solidFill>
-                        <a:effectLst/>
-                        <a:latin typeface="Trebuchet MS" panose="020B0703020202090204" pitchFamily="34" charset="0"/>
-                      </a:endParaRPr>
-                    </a:p>
-                  </a:txBody>
-                  <a:tcPr marL="9525" marR="9525" marT="9525" marB="0" anchor="ctr"/>
+                  <a:tcPr/>
                 </a:tc>
                 <a:tc>
                   <a:txBody>
                     <a:bodyPr/>
                     <a:lstStyle/>
                     <a:p>
-                      <a:pPr algn="ctr" rtl="0" fontAlgn="ctr"/>
+                      <a:pPr algn="ctr">
+                        <a:buNone/>
+                      </a:pPr>
                       <a:r>
-                        <a:rPr lang="en-US" sz="1800" u="none" strike="noStrike">
-                          <a:effectLst/>
+                        <a:rPr lang="en-US" sz="1800"/>
+                        <a:t>4.75%</a:t>
+                      </a:r>
+                    </a:p>
+                  </a:txBody>
+                  <a:tcPr/>
+                </a:tc>
+                <a:extLst>
+                  <a:ext uri="{0D108BD9-81ED-4DB2-BD59-A6C34878D82A}">
+                    <a16:rowId xmlns:a16="http://schemas.microsoft.com/office/drawing/2014/main" val="10001"/>
+                  </a:ext>
+                </a:extLst>
+              </a:tr>
+              <a:tr h="890905">
+                <a:tc>
+                  <a:txBody>
+                    <a:bodyPr/>
+                    <a:lstStyle/>
+                    <a:p>
+                      <a:pPr algn="ctr">
+                        <a:buNone/>
+                      </a:pPr>
+                      <a:r>
+                        <a:rPr lang="en-US" sz="1800"/>
+                        <a:t>IBU</a:t>
+                      </a:r>
+                    </a:p>
+                    <a:p>
+                      <a:pPr algn="ctr">
+                        <a:buNone/>
+                      </a:pPr>
+                      <a:r>
+                        <a:rPr lang="en-US" sz="1400">
+                          <a:sym typeface="+mn-ea"/>
                         </a:rPr>
-                        <a:t>4.7625</a:t>
+                        <a:t>(avg)</a:t>
                       </a:r>
-                      <a:endParaRPr lang="en-US" sz="1800" b="0" i="0" u="none" strike="noStrike">
-                        <a:solidFill>
-                          <a:srgbClr val="000000"/>
-                        </a:solidFill>
-                        <a:effectLst/>
-                        <a:latin typeface="Trebuchet MS" panose="020B0703020202090204" pitchFamily="34" charset="0"/>
+                    </a:p>
+                    <a:p>
+                      <a:pPr algn="ctr">
+                        <a:buNone/>
+                      </a:pPr>
+                      <a:endParaRPr lang="en-US" sz="1400">
+                        <a:sym typeface="+mn-ea"/>
                       </a:endParaRPr>
                     </a:p>
                   </a:txBody>
-                  <a:tcPr marL="9525" marR="9525" marT="9525" marB="0" anchor="ctr">
-                    <a:solidFill>
-                      <a:schemeClr val="accent2"/>
-                    </a:solidFill>
-                  </a:tcPr>
+                  <a:tcPr/>
                 </a:tc>
                 <a:tc>
                   <a:txBody>
                     <a:bodyPr/>
                     <a:lstStyle/>
                     <a:p>
-                      <a:pPr algn="ctr" rtl="0" fontAlgn="ctr"/>
+                      <a:pPr algn="ctr">
+                        <a:buNone/>
+                      </a:pPr>
                       <a:r>
-                        <a:rPr lang="en-US" sz="1800" u="none" strike="noStrike">
-                          <a:effectLst/>
-                        </a:rPr>
-                        <a:t>1.8445</a:t>
+                        <a:rPr lang="en-US" sz="1800"/>
+                        <a:t>75</a:t>
                       </a:r>
-                      <a:endParaRPr lang="en-US" sz="1800" b="0" i="0" u="none" strike="noStrike">
-                        <a:solidFill>
-                          <a:srgbClr val="000000"/>
-                        </a:solidFill>
-                        <a:effectLst/>
-                        <a:latin typeface="Trebuchet MS" panose="020B0703020202090204" pitchFamily="34" charset="0"/>
-                      </a:endParaRPr>
                     </a:p>
                   </a:txBody>
-                  <a:tcPr marL="9525" marR="9525" marT="9525" marB="0" anchor="ctr">
-                    <a:solidFill>
-                      <a:schemeClr val="accent2"/>
-                    </a:solidFill>
-                  </a:tcPr>
+                  <a:tcPr/>
                 </a:tc>
                 <a:tc>
                   <a:txBody>
                     <a:bodyPr/>
                     <a:lstStyle/>
                     <a:p>
-                      <a:pPr algn="ctr" rtl="0" fontAlgn="ctr"/>
+                      <a:pPr algn="ctr">
+                        <a:buNone/>
+                      </a:pPr>
                       <a:r>
-                        <a:rPr lang="en-US" sz="1800" u="none" strike="noStrike">
-                          <a:effectLst/>
-                        </a:rPr>
-                        <a:t>3.57</a:t>
+                        <a:rPr lang="en-US" sz="1800"/>
+                        <a:t>31</a:t>
                       </a:r>
-                      <a:endParaRPr lang="en-US" sz="1800" b="0" i="0" u="none" strike="noStrike">
-                        <a:solidFill>
-                          <a:srgbClr val="000000"/>
-                        </a:solidFill>
-                        <a:effectLst/>
-                        <a:latin typeface="Trebuchet MS" panose="020B0703020202090204" pitchFamily="34" charset="0"/>
-                      </a:endParaRPr>
                     </a:p>
                   </a:txBody>
-                  <a:tcPr marL="9525" marR="9525" marT="9525" marB="0" anchor="ctr">
-                    <a:solidFill>
-                      <a:schemeClr val="accent3"/>
-                    </a:solidFill>
-                  </a:tcPr>
+                  <a:tcPr/>
                 </a:tc>
                 <a:tc>
                   <a:txBody>
                     <a:bodyPr/>
                     <a:lstStyle/>
                     <a:p>
-                      <a:pPr algn="ctr" rtl="0" fontAlgn="ctr"/>
+                      <a:pPr algn="ctr">
+                        <a:buNone/>
+                      </a:pPr>
                       <a:r>
-                        <a:rPr lang="en-US" sz="1800" u="none" strike="noStrike" dirty="0">
-                          <a:effectLst/>
-                        </a:rPr>
-                        <a:t>3.16</a:t>
+                        <a:rPr lang="en-US" sz="1800"/>
+                        <a:t>40</a:t>
                       </a:r>
-                      <a:endParaRPr lang="en-US" sz="1800" b="0" i="0" u="none" strike="noStrike" dirty="0">
-                        <a:solidFill>
-                          <a:srgbClr val="000000"/>
-                        </a:solidFill>
-                        <a:effectLst/>
-                        <a:latin typeface="Trebuchet MS" panose="020B0703020202090204" pitchFamily="34" charset="0"/>
-                      </a:endParaRPr>
                     </a:p>
                   </a:txBody>
-                  <a:tcPr marL="9525" marR="9525" marT="9525" marB="0" anchor="ctr">
-                    <a:solidFill>
-                      <a:schemeClr val="accent3"/>
-                    </a:solidFill>
-                  </a:tcPr>
+                  <a:tcPr/>
                 </a:tc>
                 <a:tc>
                   <a:txBody>
                     <a:bodyPr/>
                     <a:lstStyle/>
                     <a:p>
-                      <a:pPr algn="ctr" rtl="0" fontAlgn="ctr"/>
+                      <a:pPr algn="ctr">
+                        <a:buNone/>
+                      </a:pPr>
                       <a:r>
-                        <a:rPr lang="en-US" sz="1800" u="none" strike="noStrike" dirty="0">
-                          <a:effectLst/>
-                        </a:rPr>
-                        <a:t>3.14</a:t>
+                        <a:rPr lang="en-US" sz="1800"/>
+                        <a:t>26</a:t>
                       </a:r>
-                      <a:endParaRPr lang="en-US" sz="1800" b="0" i="0" u="none" strike="noStrike" dirty="0">
-                        <a:solidFill>
-                          <a:srgbClr val="000000"/>
-                        </a:solidFill>
-                        <a:effectLst/>
-                        <a:latin typeface="Trebuchet MS" panose="020B0703020202090204" pitchFamily="34" charset="0"/>
-                      </a:endParaRPr>
                     </a:p>
                   </a:txBody>
-                  <a:tcPr marL="9525" marR="9525" marT="9525" marB="0" anchor="ctr">
-                    <a:solidFill>
-                      <a:schemeClr val="accent3"/>
-                    </a:solidFill>
-                  </a:tcPr>
-                </a:tc>
-                <a:extLst>
-                  <a:ext uri="{0D108BD9-81ED-4DB2-BD59-A6C34878D82A}">
-                    <a16:rowId xmlns:a16="http://schemas.microsoft.com/office/drawing/2014/main" val="2304088812"/>
-                  </a:ext>
-                </a:extLst>
-              </a:tr>
-              <a:tr h="292100">
-                <a:tc>
-                  <a:txBody>
-                    <a:bodyPr/>
-                    <a:lstStyle/>
-                    <a:p>
-                      <a:pPr algn="ctr" rtl="0" fontAlgn="ctr"/>
-                      <a:r>
-                        <a:rPr lang="en-US" sz="1800" u="none" strike="noStrike" dirty="0" err="1">
-                          <a:effectLst/>
-                        </a:rPr>
-                        <a:t>FrankenRank</a:t>
-                      </a:r>
-                      <a:r>
-                        <a:rPr lang="en-US" baseline="30000" dirty="0" err="1"/>
-                        <a:t>TM</a:t>
-                      </a:r>
-                      <a:r>
-                        <a:rPr lang="en-US" sz="1800" u="none" strike="noStrike" dirty="0">
-                          <a:effectLst/>
-                        </a:rPr>
-                        <a:t> (By State)</a:t>
-                      </a:r>
-                      <a:endParaRPr lang="en-US" sz="1800" b="0" i="0" u="none" strike="noStrike" dirty="0">
-                        <a:solidFill>
-                          <a:srgbClr val="000000"/>
-                        </a:solidFill>
-                        <a:effectLst/>
-                        <a:latin typeface="Trebuchet MS" panose="020B0703020202090204" pitchFamily="34" charset="0"/>
-                      </a:endParaRPr>
-                    </a:p>
-                  </a:txBody>
-                  <a:tcPr marL="9525" marR="9525" marT="9525" marB="0" anchor="ctr"/>
+                  <a:tcPr/>
                 </a:tc>
                 <a:tc>
                   <a:txBody>
                     <a:bodyPr/>
                     <a:lstStyle/>
                     <a:p>
-                      <a:pPr algn="ctr" rtl="0" fontAlgn="ctr"/>
+                      <a:pPr algn="ctr">
+                        <a:buNone/>
+                      </a:pPr>
                       <a:r>
-                        <a:rPr lang="en-US" sz="1800" u="none" strike="noStrike">
-                          <a:effectLst/>
-                        </a:rPr>
-                        <a:t>N/A</a:t>
+                        <a:rPr lang="en-US" sz="1800"/>
+                        <a:t>20</a:t>
                       </a:r>
-                      <a:endParaRPr lang="en-US" sz="1800" b="0" i="0" u="none" strike="noStrike">
-                        <a:solidFill>
-                          <a:srgbClr val="000000"/>
-                        </a:solidFill>
-                        <a:effectLst/>
-                        <a:latin typeface="Trebuchet MS" panose="020B0703020202090204" pitchFamily="34" charset="0"/>
-                      </a:endParaRPr>
                     </a:p>
                   </a:txBody>
-                  <a:tcPr marL="9525" marR="9525" marT="9525" marB="0" anchor="ctr">
-                    <a:solidFill>
-                      <a:schemeClr val="accent2"/>
-                    </a:solidFill>
-                  </a:tcPr>
-                </a:tc>
-                <a:tc>
-                  <a:txBody>
-                    <a:bodyPr/>
-                    <a:lstStyle/>
-                    <a:p>
-                      <a:pPr algn="ctr" rtl="0" fontAlgn="ctr"/>
-                      <a:r>
-                        <a:rPr lang="en-US" sz="1800" u="none" strike="noStrike" dirty="0">
-                          <a:effectLst/>
-                        </a:rPr>
-                        <a:t>N/A</a:t>
-                      </a:r>
-                      <a:endParaRPr lang="en-US" sz="1800" b="0" i="0" u="none" strike="noStrike" dirty="0">
-                        <a:solidFill>
-                          <a:srgbClr val="000000"/>
-                        </a:solidFill>
-                        <a:effectLst/>
-                        <a:latin typeface="Trebuchet MS" panose="020B0703020202090204" pitchFamily="34" charset="0"/>
-                      </a:endParaRPr>
-                    </a:p>
-                  </a:txBody>
-                  <a:tcPr marL="9525" marR="9525" marT="9525" marB="0" anchor="ctr">
-                    <a:solidFill>
-                      <a:schemeClr val="accent2"/>
-                    </a:solidFill>
-                  </a:tcPr>
-                </a:tc>
-                <a:tc>
-                  <a:txBody>
-                    <a:bodyPr/>
-                    <a:lstStyle/>
-                    <a:p>
-                      <a:pPr algn="ctr" rtl="0" fontAlgn="ctr"/>
-                      <a:r>
-                        <a:rPr lang="en-US" sz="1800" u="none" strike="noStrike">
-                          <a:effectLst/>
-                        </a:rPr>
-                        <a:t>#1</a:t>
-                      </a:r>
-                      <a:endParaRPr lang="en-US" sz="1800" b="0" i="0" u="none" strike="noStrike">
-                        <a:solidFill>
-                          <a:srgbClr val="000000"/>
-                        </a:solidFill>
-                        <a:effectLst/>
-                        <a:latin typeface="Trebuchet MS" panose="020B0703020202090204" pitchFamily="34" charset="0"/>
-                      </a:endParaRPr>
-                    </a:p>
-                  </a:txBody>
-                  <a:tcPr marL="9525" marR="9525" marT="9525" marB="0" anchor="ctr">
-                    <a:solidFill>
-                      <a:schemeClr val="accent3"/>
-                    </a:solidFill>
-                  </a:tcPr>
-                </a:tc>
-                <a:tc>
-                  <a:txBody>
-                    <a:bodyPr/>
-                    <a:lstStyle/>
-                    <a:p>
-                      <a:pPr algn="ctr" rtl="0" fontAlgn="ctr"/>
-                      <a:r>
-                        <a:rPr lang="en-US" sz="1800" u="none" strike="noStrike">
-                          <a:effectLst/>
-                        </a:rPr>
-                        <a:t>#2</a:t>
-                      </a:r>
-                      <a:endParaRPr lang="en-US" sz="1800" b="0" i="0" u="none" strike="noStrike">
-                        <a:solidFill>
-                          <a:srgbClr val="000000"/>
-                        </a:solidFill>
-                        <a:effectLst/>
-                        <a:latin typeface="Trebuchet MS" panose="020B0703020202090204" pitchFamily="34" charset="0"/>
-                      </a:endParaRPr>
-                    </a:p>
-                  </a:txBody>
-                  <a:tcPr marL="9525" marR="9525" marT="9525" marB="0" anchor="ctr">
-                    <a:solidFill>
-                      <a:schemeClr val="accent3"/>
-                    </a:solidFill>
-                  </a:tcPr>
-                </a:tc>
-                <a:tc>
-                  <a:txBody>
-                    <a:bodyPr/>
-                    <a:lstStyle/>
-                    <a:p>
-                      <a:pPr algn="ctr" rtl="0" fontAlgn="ctr"/>
-                      <a:r>
-                        <a:rPr lang="en-US" sz="1800" u="none" strike="noStrike" dirty="0">
-                          <a:effectLst/>
-                        </a:rPr>
-                        <a:t>#3</a:t>
-                      </a:r>
-                      <a:endParaRPr lang="en-US" sz="1800" b="0" i="0" u="none" strike="noStrike" dirty="0">
-                        <a:solidFill>
-                          <a:srgbClr val="000000"/>
-                        </a:solidFill>
-                        <a:effectLst/>
-                        <a:latin typeface="Trebuchet MS" panose="020B0703020202090204" pitchFamily="34" charset="0"/>
-                      </a:endParaRPr>
-                    </a:p>
-                  </a:txBody>
-                  <a:tcPr marL="9525" marR="9525" marT="9525" marB="0" anchor="ctr">
-                    <a:solidFill>
-                      <a:schemeClr val="accent3"/>
-                    </a:solidFill>
-                  </a:tcPr>
+                  <a:tcPr/>
                 </a:tc>
                 <a:extLst>
                   <a:ext uri="{0D108BD9-81ED-4DB2-BD59-A6C34878D82A}">
-                    <a16:rowId xmlns:a16="http://schemas.microsoft.com/office/drawing/2014/main" val="807518460"/>
+                    <a16:rowId xmlns:a16="http://schemas.microsoft.com/office/drawing/2014/main" val="10002"/>
                   </a:ext>
                 </a:extLst>
               </a:tr>
@@ -10525,15 +9481,72 @@
           <a:chExt cx="0" cy="0"/>
         </a:xfrm>
       </p:grpSpPr>
+      <p:sp>
+        <p:nvSpPr>
+          <p:cNvPr id="2" name="Title 1"/>
+          <p:cNvSpPr>
+            <a:spLocks noGrp="1"/>
+          </p:cNvSpPr>
+          <p:nvPr>
+            <p:ph type="title"/>
+          </p:nvPr>
+        </p:nvSpPr>
+        <p:spPr/>
+        <p:txBody>
+          <a:bodyPr/>
+          <a:lstStyle/>
+          <a:p>
+            <a:r>
+              <a:rPr lang="en-US" dirty="0"/>
+              <a:t>Conclusion</a:t>
+            </a:r>
+          </a:p>
+        </p:txBody>
+      </p:sp>
+      <p:sp>
+        <p:nvSpPr>
+          <p:cNvPr id="3" name="Content Placeholder 2"/>
+          <p:cNvSpPr>
+            <a:spLocks noGrp="1"/>
+          </p:cNvSpPr>
+          <p:nvPr>
+            <p:ph idx="1"/>
+          </p:nvPr>
+        </p:nvSpPr>
+        <p:spPr>
+          <a:xfrm>
+            <a:off x="132715" y="2070100"/>
+            <a:ext cx="5780405" cy="4596130"/>
+          </a:xfrm>
+        </p:spPr>
+        <p:txBody>
+          <a:bodyPr>
+            <a:normAutofit fontScale="97500" lnSpcReduction="10000"/>
+          </a:bodyPr>
+          <a:lstStyle/>
+          <a:p>
+            <a:r>
+              <a:rPr lang="en-US"/>
+              <a:t>Our FrankenBeer has distinct qualities that make it appealing to many demographics of beer drinkers. Initial testing has been done in the Seattle, Washington and Boulder, Colorado markets with much success.</a:t>
+            </a:r>
+          </a:p>
+          <a:p>
+            <a:r>
+              <a:rPr lang="en-US"/>
+              <a:t>San Antonio, Texas; Salt Lake City, Utah; and Boston, Massachusetts all have a different craft beer presence, but none like our FrankenBeer. </a:t>
+            </a:r>
+          </a:p>
+          <a:p>
+            <a:r>
+              <a:rPr lang="en-US"/>
+              <a:t>With its high octane ABV of 12% and its subtle IBU of 33, we believe our FrankenBeer will make its mark in these new markets.</a:t>
+            </a:r>
+          </a:p>
+        </p:txBody>
+      </p:sp>
       <p:pic>
         <p:nvPicPr>
-          <p:cNvPr id="6" name="Picture 5">
-            <a:extLst>
-              <a:ext uri="{FF2B5EF4-FFF2-40B4-BE49-F238E27FC236}">
-                <a16:creationId xmlns:a16="http://schemas.microsoft.com/office/drawing/2014/main" id="{2608176A-5942-F340-A409-6E3B241D92CD}"/>
-              </a:ext>
-            </a:extLst>
-          </p:cNvPr>
+          <p:cNvPr id="5" name="Picture 4"/>
           <p:cNvPicPr>
             <a:picLocks noChangeAspect="1"/>
           </p:cNvPicPr>
@@ -10547,8 +9560,8 @@
         </p:blipFill>
         <p:spPr>
           <a:xfrm>
-            <a:off x="6333305" y="2243989"/>
-            <a:ext cx="5194669" cy="4017211"/>
+            <a:off x="5913120" y="2602865"/>
+            <a:ext cx="6124575" cy="3798570"/>
           </a:xfrm>
           <a:prstGeom prst="rect">
             <a:avLst/>
@@ -10557,92 +9570,13 @@
       </p:pic>
       <p:sp>
         <p:nvSpPr>
-          <p:cNvPr id="2" name="Title 1"/>
-          <p:cNvSpPr>
-            <a:spLocks noGrp="1"/>
-          </p:cNvSpPr>
-          <p:nvPr>
-            <p:ph type="title"/>
-          </p:nvPr>
-        </p:nvSpPr>
-        <p:spPr/>
-        <p:txBody>
-          <a:bodyPr/>
-          <a:lstStyle/>
-          <a:p>
-            <a:r>
-              <a:rPr lang="en-US" dirty="0"/>
-              <a:t>Conclusion</a:t>
-            </a:r>
-          </a:p>
-        </p:txBody>
-      </p:sp>
-      <p:sp>
-        <p:nvSpPr>
-          <p:cNvPr id="3" name="Content Placeholder 2"/>
-          <p:cNvSpPr>
-            <a:spLocks noGrp="1"/>
-          </p:cNvSpPr>
-          <p:nvPr>
-            <p:ph idx="1"/>
-          </p:nvPr>
-        </p:nvSpPr>
-        <p:spPr>
-          <a:xfrm>
-            <a:off x="132715" y="2070100"/>
-            <a:ext cx="5780405" cy="4596130"/>
-          </a:xfrm>
-        </p:spPr>
-        <p:txBody>
-          <a:bodyPr>
-            <a:normAutofit fontScale="97500" lnSpcReduction="10000"/>
-          </a:bodyPr>
-          <a:lstStyle/>
-          <a:p>
-            <a:r>
-              <a:rPr lang="en-US" dirty="0"/>
-              <a:t>Our </a:t>
-            </a:r>
-            <a:r>
-              <a:rPr lang="en-US" dirty="0" err="1"/>
-              <a:t>FrankenBeer</a:t>
-            </a:r>
-            <a:r>
-              <a:rPr lang="en-US" dirty="0"/>
-              <a:t> has distinct qualities that make it appealing to many demographics of beer drinkers. Initial testing has been done in the Seattle, Washington and Boulder, Colorado markets with much success.</a:t>
-            </a:r>
-          </a:p>
-          <a:p>
-            <a:r>
-              <a:rPr lang="en-US" dirty="0"/>
-              <a:t>West Virginia, New Mexico, and Florida represent the top three markets in terms of median bitterness by alcohol content</a:t>
-            </a:r>
-          </a:p>
-          <a:p>
-            <a:r>
-              <a:rPr lang="en-US" dirty="0"/>
-              <a:t>With its high octane ABV of 12% and its subtle IBU of 33, we believe our </a:t>
-            </a:r>
-            <a:r>
-              <a:rPr lang="en-US" dirty="0" err="1"/>
-              <a:t>FrankenBeer</a:t>
-            </a:r>
-            <a:r>
-              <a:rPr lang="en-US" dirty="0"/>
-              <a:t> will make its mark in these new markets.</a:t>
-            </a:r>
-          </a:p>
-        </p:txBody>
-      </p:sp>
-      <p:sp>
-        <p:nvSpPr>
           <p:cNvPr id="12" name="5-Point Star 11"/>
           <p:cNvSpPr/>
           <p:nvPr/>
         </p:nvSpPr>
         <p:spPr>
           <a:xfrm>
-            <a:off x="10283704" y="5243362"/>
+            <a:off x="8650605" y="5532120"/>
             <a:ext cx="280035" cy="255270"/>
           </a:xfrm>
           <a:prstGeom prst="star5">
@@ -10692,7 +9626,7 @@
         </p:nvSpPr>
         <p:spPr>
           <a:xfrm>
-            <a:off x="7969063" y="4112895"/>
+            <a:off x="7158990" y="3997325"/>
             <a:ext cx="280035" cy="255270"/>
           </a:xfrm>
           <a:prstGeom prst="star5">
@@ -10742,7 +9676,7 @@
         </p:nvSpPr>
         <p:spPr>
           <a:xfrm>
-            <a:off x="10164891" y="3997324"/>
+            <a:off x="11515725" y="3481070"/>
             <a:ext cx="280035" cy="255270"/>
           </a:xfrm>
           <a:prstGeom prst="star5">
@@ -11044,299 +9978,4 @@
     </a:ext>
   </a:extLst>
 </a:theme>
-</file>
-
-<file path=ppt/theme/theme2.xml><?xml version="1.0" encoding="utf-8"?>
-<a:theme xmlns:a="http://schemas.openxmlformats.org/drawingml/2006/main" name="Office Theme">
-  <a:themeElements>
-    <a:clrScheme name="Office">
-      <a:dk1>
-        <a:sysClr val="windowText" lastClr="000000"/>
-      </a:dk1>
-      <a:lt1>
-        <a:sysClr val="window" lastClr="FFFFFF"/>
-      </a:lt1>
-      <a:dk2>
-        <a:srgbClr val="44546A"/>
-      </a:dk2>
-      <a:lt2>
-        <a:srgbClr val="E7E6E6"/>
-      </a:lt2>
-      <a:accent1>
-        <a:srgbClr val="4472C4"/>
-      </a:accent1>
-      <a:accent2>
-        <a:srgbClr val="ED7D31"/>
-      </a:accent2>
-      <a:accent3>
-        <a:srgbClr val="A5A5A5"/>
-      </a:accent3>
-      <a:accent4>
-        <a:srgbClr val="FFC000"/>
-      </a:accent4>
-      <a:accent5>
-        <a:srgbClr val="5B9BD5"/>
-      </a:accent5>
-      <a:accent6>
-        <a:srgbClr val="70AD47"/>
-      </a:accent6>
-      <a:hlink>
-        <a:srgbClr val="0563C1"/>
-      </a:hlink>
-      <a:folHlink>
-        <a:srgbClr val="954F72"/>
-      </a:folHlink>
-    </a:clrScheme>
-    <a:fontScheme name="Office">
-      <a:majorFont>
-        <a:latin typeface="Calibri Light" panose="020F0302020204030204"/>
-        <a:ea typeface=""/>
-        <a:cs typeface=""/>
-        <a:font script="Jpan" typeface="游ゴシック Light"/>
-        <a:font script="Hang" typeface="맑은 고딕"/>
-        <a:font script="Hans" typeface="等线 Light"/>
-        <a:font script="Hant" typeface="新細明體"/>
-        <a:font script="Arab" typeface="Times New Roman"/>
-        <a:font script="Hebr" typeface="Times New Roman"/>
-        <a:font script="Thai" typeface="Angsana New"/>
-        <a:font script="Ethi" typeface="Nyala"/>
-        <a:font script="Beng" typeface="Vrinda"/>
-        <a:font script="Gujr" typeface="Shruti"/>
-        <a:font script="Khmr" typeface="MoolBoran"/>
-        <a:font script="Knda" typeface="Tunga"/>
-        <a:font script="Guru" typeface="Raavi"/>
-        <a:font script="Cans" typeface="Euphemia"/>
-        <a:font script="Cher" typeface="Plantagenet Cherokee"/>
-        <a:font script="Yiii" typeface="Microsoft Yi Baiti"/>
-        <a:font script="Tibt" typeface="Microsoft Himalaya"/>
-        <a:font script="Thaa" typeface="MV Boli"/>
-        <a:font script="Deva" typeface="Mangal"/>
-        <a:font script="Telu" typeface="Gautami"/>
-        <a:font script="Taml" typeface="Latha"/>
-        <a:font script="Syrc" typeface="Estrangelo Edessa"/>
-        <a:font script="Orya" typeface="Kalinga"/>
-        <a:font script="Mlym" typeface="Kartika"/>
-        <a:font script="Laoo" typeface="DokChampa"/>
-        <a:font script="Sinh" typeface="Iskoola Pota"/>
-        <a:font script="Mong" typeface="Mongolian Baiti"/>
-        <a:font script="Viet" typeface="Times New Roman"/>
-        <a:font script="Uigh" typeface="Microsoft Uighur"/>
-        <a:font script="Geor" typeface="Sylfaen"/>
-        <a:font script="Armn" typeface="Arial"/>
-        <a:font script="Bugi" typeface="Leelawadee UI"/>
-        <a:font script="Bopo" typeface="Microsoft JhengHei"/>
-        <a:font script="Java" typeface="Javanese Text"/>
-        <a:font script="Lisu" typeface="Segoe UI"/>
-        <a:font script="Mymr" typeface="Myanmar Text"/>
-        <a:font script="Nkoo" typeface="Ebrima"/>
-        <a:font script="Olck" typeface="Nirmala UI"/>
-        <a:font script="Osma" typeface="Ebrima"/>
-        <a:font script="Phag" typeface="Phagspa"/>
-        <a:font script="Syrn" typeface="Estrangelo Edessa"/>
-        <a:font script="Syrj" typeface="Estrangelo Edessa"/>
-        <a:font script="Syre" typeface="Estrangelo Edessa"/>
-        <a:font script="Sora" typeface="Nirmala UI"/>
-        <a:font script="Tale" typeface="Microsoft Tai Le"/>
-        <a:font script="Talu" typeface="Microsoft New Tai Lue"/>
-        <a:font script="Tfng" typeface="Ebrima"/>
-      </a:majorFont>
-      <a:minorFont>
-        <a:latin typeface="Calibri" panose="020F0502020204030204"/>
-        <a:ea typeface=""/>
-        <a:cs typeface=""/>
-        <a:font script="Jpan" typeface="游ゴシック"/>
-        <a:font script="Hang" typeface="맑은 고딕"/>
-        <a:font script="Hans" typeface="等线"/>
-        <a:font script="Hant" typeface="新細明體"/>
-        <a:font script="Arab" typeface="Arial"/>
-        <a:font script="Hebr" typeface="Arial"/>
-        <a:font script="Thai" typeface="Cordia New"/>
-        <a:font script="Ethi" typeface="Nyala"/>
-        <a:font script="Beng" typeface="Vrinda"/>
-        <a:font script="Gujr" typeface="Shruti"/>
-        <a:font script="Khmr" typeface="DaunPenh"/>
-        <a:font script="Knda" typeface="Tunga"/>
-        <a:font script="Guru" typeface="Raavi"/>
-        <a:font script="Cans" typeface="Euphemia"/>
-        <a:font script="Cher" typeface="Plantagenet Cherokee"/>
-        <a:font script="Yiii" typeface="Microsoft Yi Baiti"/>
-        <a:font script="Tibt" typeface="Microsoft Himalaya"/>
-        <a:font script="Thaa" typeface="MV Boli"/>
-        <a:font script="Deva" typeface="Mangal"/>
-        <a:font script="Telu" typeface="Gautami"/>
-        <a:font script="Taml" typeface="Latha"/>
-        <a:font script="Syrc" typeface="Estrangelo Edessa"/>
-        <a:font script="Orya" typeface="Kalinga"/>
-        <a:font script="Mlym" typeface="Kartika"/>
-        <a:font script="Laoo" typeface="DokChampa"/>
-        <a:font script="Sinh" typeface="Iskoola Pota"/>
-        <a:font script="Mong" typeface="Mongolian Baiti"/>
-        <a:font script="Viet" typeface="Arial"/>
-        <a:font script="Uigh" typeface="Microsoft Uighur"/>
-        <a:font script="Geor" typeface="Sylfaen"/>
-        <a:font script="Armn" typeface="Arial"/>
-        <a:font script="Bugi" typeface="Leelawadee UI"/>
-        <a:font script="Bopo" typeface="Microsoft JhengHei"/>
-        <a:font script="Java" typeface="Javanese Text"/>
-        <a:font script="Lisu" typeface="Segoe UI"/>
-        <a:font script="Mymr" typeface="Myanmar Text"/>
-        <a:font script="Nkoo" typeface="Ebrima"/>
-        <a:font script="Olck" typeface="Nirmala UI"/>
-        <a:font script="Osma" typeface="Ebrima"/>
-        <a:font script="Phag" typeface="Phagspa"/>
-        <a:font script="Syrn" typeface="Estrangelo Edessa"/>
-        <a:font script="Syrj" typeface="Estrangelo Edessa"/>
-        <a:font script="Syre" typeface="Estrangelo Edessa"/>
-        <a:font script="Sora" typeface="Nirmala UI"/>
-        <a:font script="Tale" typeface="Microsoft Tai Le"/>
-        <a:font script="Talu" typeface="Microsoft New Tai Lue"/>
-        <a:font script="Tfng" typeface="Ebrima"/>
-      </a:minorFont>
-    </a:fontScheme>
-    <a:fmtScheme name="Office">
-      <a:fillStyleLst>
-        <a:solidFill>
-          <a:schemeClr val="phClr"/>
-        </a:solidFill>
-        <a:gradFill rotWithShape="1">
-          <a:gsLst>
-            <a:gs pos="0">
-              <a:schemeClr val="phClr">
-                <a:lumMod val="110000"/>
-                <a:satMod val="105000"/>
-                <a:tint val="67000"/>
-              </a:schemeClr>
-            </a:gs>
-            <a:gs pos="50000">
-              <a:schemeClr val="phClr">
-                <a:lumMod val="105000"/>
-                <a:satMod val="103000"/>
-                <a:tint val="73000"/>
-              </a:schemeClr>
-            </a:gs>
-            <a:gs pos="100000">
-              <a:schemeClr val="phClr">
-                <a:lumMod val="105000"/>
-                <a:satMod val="109000"/>
-                <a:tint val="81000"/>
-              </a:schemeClr>
-            </a:gs>
-          </a:gsLst>
-          <a:lin ang="5400000" scaled="0"/>
-        </a:gradFill>
-        <a:gradFill rotWithShape="1">
-          <a:gsLst>
-            <a:gs pos="0">
-              <a:schemeClr val="phClr">
-                <a:satMod val="103000"/>
-                <a:lumMod val="102000"/>
-                <a:tint val="94000"/>
-              </a:schemeClr>
-            </a:gs>
-            <a:gs pos="50000">
-              <a:schemeClr val="phClr">
-                <a:satMod val="110000"/>
-                <a:lumMod val="100000"/>
-                <a:shade val="100000"/>
-              </a:schemeClr>
-            </a:gs>
-            <a:gs pos="100000">
-              <a:schemeClr val="phClr">
-                <a:lumMod val="99000"/>
-                <a:satMod val="120000"/>
-                <a:shade val="78000"/>
-              </a:schemeClr>
-            </a:gs>
-          </a:gsLst>
-          <a:lin ang="5400000" scaled="0"/>
-        </a:gradFill>
-      </a:fillStyleLst>
-      <a:lnStyleLst>
-        <a:ln w="6350" cap="flat" cmpd="sng" algn="ctr">
-          <a:solidFill>
-            <a:schemeClr val="phClr"/>
-          </a:solidFill>
-          <a:prstDash val="solid"/>
-          <a:miter lim="800000"/>
-        </a:ln>
-        <a:ln w="12700" cap="flat" cmpd="sng" algn="ctr">
-          <a:solidFill>
-            <a:schemeClr val="phClr"/>
-          </a:solidFill>
-          <a:prstDash val="solid"/>
-          <a:miter lim="800000"/>
-        </a:ln>
-        <a:ln w="19050" cap="flat" cmpd="sng" algn="ctr">
-          <a:solidFill>
-            <a:schemeClr val="phClr"/>
-          </a:solidFill>
-          <a:prstDash val="solid"/>
-          <a:miter lim="800000"/>
-        </a:ln>
-      </a:lnStyleLst>
-      <a:effectStyleLst>
-        <a:effectStyle>
-          <a:effectLst/>
-        </a:effectStyle>
-        <a:effectStyle>
-          <a:effectLst/>
-        </a:effectStyle>
-        <a:effectStyle>
-          <a:effectLst>
-            <a:outerShdw blurRad="57150" dist="19050" dir="5400000" algn="ctr" rotWithShape="0">
-              <a:srgbClr val="000000">
-                <a:alpha val="63000"/>
-              </a:srgbClr>
-            </a:outerShdw>
-          </a:effectLst>
-        </a:effectStyle>
-      </a:effectStyleLst>
-      <a:bgFillStyleLst>
-        <a:solidFill>
-          <a:schemeClr val="phClr"/>
-        </a:solidFill>
-        <a:solidFill>
-          <a:schemeClr val="phClr">
-            <a:tint val="95000"/>
-            <a:satMod val="170000"/>
-          </a:schemeClr>
-        </a:solidFill>
-        <a:gradFill rotWithShape="1">
-          <a:gsLst>
-            <a:gs pos="0">
-              <a:schemeClr val="phClr">
-                <a:tint val="93000"/>
-                <a:satMod val="150000"/>
-                <a:shade val="98000"/>
-                <a:lumMod val="102000"/>
-              </a:schemeClr>
-            </a:gs>
-            <a:gs pos="50000">
-              <a:schemeClr val="phClr">
-                <a:tint val="98000"/>
-                <a:satMod val="130000"/>
-                <a:shade val="90000"/>
-                <a:lumMod val="103000"/>
-              </a:schemeClr>
-            </a:gs>
-            <a:gs pos="100000">
-              <a:schemeClr val="phClr">
-                <a:shade val="63000"/>
-                <a:satMod val="120000"/>
-              </a:schemeClr>
-            </a:gs>
-          </a:gsLst>
-          <a:lin ang="5400000" scaled="0"/>
-        </a:gradFill>
-      </a:bgFillStyleLst>
-    </a:fmtScheme>
-  </a:themeElements>
-  <a:objectDefaults/>
-  <a:extraClrSchemeLst/>
-  <a:extLst>
-    <a:ext uri="{05A4C25C-085E-4340-85A3-A5531E510DB2}">
-      <thm15:themeFamily xmlns:thm15="http://schemas.microsoft.com/office/thememl/2012/main" name="Office Theme" id="{62F939B6-93AF-4DB8-9C6B-D6C7DFDC589F}" vid="{4A3C46E8-61CC-4603-A589-7422A47A8E4A}"/>
-    </a:ext>
-  </a:extLst>
-</a:theme>
 </file>
</xml_diff>